<commit_message>
small fine-tune of workshop materials
</commit_message>
<xml_diff>
--- a/workshop/_Slides-Handout.pptx
+++ b/workshop/_Slides-Handout.pptx
@@ -5,7 +5,7 @@
     <p:sldMasterId id="2147483648" r:id="rId1"/>
   </p:sldMasterIdLst>
   <p:notesMasterIdLst>
-    <p:notesMasterId r:id="rId29"/>
+    <p:notesMasterId r:id="rId28"/>
   </p:notesMasterIdLst>
   <p:sldIdLst>
     <p:sldId id="256" r:id="rId2"/>
@@ -14,27 +14,26 @@
     <p:sldId id="258" r:id="rId5"/>
     <p:sldId id="259" r:id="rId6"/>
     <p:sldId id="263" r:id="rId7"/>
-    <p:sldId id="280" r:id="rId8"/>
-    <p:sldId id="277" r:id="rId9"/>
-    <p:sldId id="276" r:id="rId10"/>
-    <p:sldId id="279" r:id="rId11"/>
-    <p:sldId id="264" r:id="rId12"/>
-    <p:sldId id="269" r:id="rId13"/>
-    <p:sldId id="287" r:id="rId14"/>
-    <p:sldId id="270" r:id="rId15"/>
-    <p:sldId id="284" r:id="rId16"/>
-    <p:sldId id="285" r:id="rId17"/>
-    <p:sldId id="261" r:id="rId18"/>
-    <p:sldId id="281" r:id="rId19"/>
-    <p:sldId id="282" r:id="rId20"/>
-    <p:sldId id="283" r:id="rId21"/>
-    <p:sldId id="289" r:id="rId22"/>
-    <p:sldId id="290" r:id="rId23"/>
-    <p:sldId id="291" r:id="rId24"/>
-    <p:sldId id="294" r:id="rId25"/>
-    <p:sldId id="295" r:id="rId26"/>
-    <p:sldId id="292" r:id="rId27"/>
-    <p:sldId id="293" r:id="rId28"/>
+    <p:sldId id="277" r:id="rId8"/>
+    <p:sldId id="276" r:id="rId9"/>
+    <p:sldId id="279" r:id="rId10"/>
+    <p:sldId id="264" r:id="rId11"/>
+    <p:sldId id="269" r:id="rId12"/>
+    <p:sldId id="287" r:id="rId13"/>
+    <p:sldId id="270" r:id="rId14"/>
+    <p:sldId id="284" r:id="rId15"/>
+    <p:sldId id="285" r:id="rId16"/>
+    <p:sldId id="261" r:id="rId17"/>
+    <p:sldId id="281" r:id="rId18"/>
+    <p:sldId id="282" r:id="rId19"/>
+    <p:sldId id="283" r:id="rId20"/>
+    <p:sldId id="289" r:id="rId21"/>
+    <p:sldId id="290" r:id="rId22"/>
+    <p:sldId id="291" r:id="rId23"/>
+    <p:sldId id="294" r:id="rId24"/>
+    <p:sldId id="295" r:id="rId25"/>
+    <p:sldId id="292" r:id="rId26"/>
+    <p:sldId id="293" r:id="rId27"/>
   </p:sldIdLst>
   <p:sldSz cx="12192000" cy="6858000"/>
   <p:notesSz cx="6858000" cy="9144000"/>
@@ -4133,197 +4132,6 @@
               <a:spcBef>
                 <a:spcPts val="1000"/>
               </a:spcBef>
-              <a:buFont typeface="Arial" panose="020B0604020202020204" pitchFamily="34" charset="0"/>
-            </a:pPr>
-            <a:r>
-              <a:rPr lang="en-CH" sz="3600" b="1" dirty="0">
-                <a:latin typeface="Book Antiqua" panose="02040602050305030304" pitchFamily="18" charset="0"/>
-                <a:ea typeface="+mn-ea"/>
-                <a:cs typeface="+mn-cs"/>
-              </a:rPr>
-              <a:t>Adaptive AI – 1) Different User Needs</a:t>
-            </a:r>
-          </a:p>
-        </p:txBody>
-      </p:sp>
-      <p:sp>
-        <p:nvSpPr>
-          <p:cNvPr id="3" name="Content Placeholder 2">
-            <a:extLst>
-              <a:ext uri="{FF2B5EF4-FFF2-40B4-BE49-F238E27FC236}">
-                <a16:creationId xmlns:a16="http://schemas.microsoft.com/office/drawing/2014/main" id="{D16006F8-C647-AF45-AEE7-0D7868ACAAE9}"/>
-              </a:ext>
-            </a:extLst>
-          </p:cNvPr>
-          <p:cNvSpPr>
-            <a:spLocks noGrp="1"/>
-          </p:cNvSpPr>
-          <p:nvPr>
-            <p:ph idx="1"/>
-          </p:nvPr>
-        </p:nvSpPr>
-        <p:spPr>
-          <a:xfrm>
-            <a:off x="838200" y="1825625"/>
-            <a:ext cx="10515600" cy="4351338"/>
-          </a:xfrm>
-        </p:spPr>
-        <p:txBody>
-          <a:bodyPr>
-            <a:normAutofit/>
-          </a:bodyPr>
-          <a:lstStyle/>
-          <a:p>
-            <a:pPr>
-              <a:lnSpc>
-                <a:spcPct val="117000"/>
-              </a:lnSpc>
-            </a:pPr>
-            <a:r>
-              <a:rPr lang="en-GB" sz="2400" dirty="0">
-                <a:latin typeface="Suisse Int'l" panose="020B0804000000000000" pitchFamily="34" charset="77"/>
-              </a:rPr>
-              <a:t>Recommender systems, think of Netflix recommendations</a:t>
-            </a:r>
-          </a:p>
-          <a:p>
-            <a:pPr>
-              <a:lnSpc>
-                <a:spcPct val="117000"/>
-              </a:lnSpc>
-            </a:pPr>
-            <a:r>
-              <a:rPr lang="en-GB" sz="2400" dirty="0">
-                <a:latin typeface="Suisse Int'l" panose="020B0804000000000000" pitchFamily="34" charset="77"/>
-              </a:rPr>
-              <a:t>Netflix should learn </a:t>
-            </a:r>
-            <a:r>
-              <a:rPr lang="en-GB" sz="2400" b="1" dirty="0">
-                <a:latin typeface="Suisse Int'l Semi Bold Italic" panose="020B0804000000000000" pitchFamily="34" charset="77"/>
-              </a:rPr>
-              <a:t>my</a:t>
-            </a:r>
-            <a:r>
-              <a:rPr lang="en-GB" sz="2400" dirty="0">
-                <a:latin typeface="Suisse Int'l" panose="020B0804000000000000" pitchFamily="34" charset="77"/>
-              </a:rPr>
-              <a:t> preferences</a:t>
-            </a:r>
-          </a:p>
-          <a:p>
-            <a:pPr>
-              <a:lnSpc>
-                <a:spcPct val="117000"/>
-              </a:lnSpc>
-            </a:pPr>
-            <a:r>
-              <a:rPr lang="en-GB" sz="2400" b="1" dirty="0">
-                <a:latin typeface="Suisse Int'l Semi Bold" panose="020B0804000000000000" pitchFamily="34" charset="77"/>
-              </a:rPr>
-              <a:t>Cold-start problem</a:t>
-            </a:r>
-            <a:r>
-              <a:rPr lang="en-GB" sz="2400" dirty="0">
-                <a:latin typeface="Suisse Int'l" panose="020B0804000000000000" pitchFamily="34" charset="77"/>
-              </a:rPr>
-              <a:t>: no data about new user</a:t>
-            </a:r>
-          </a:p>
-          <a:p>
-            <a:pPr>
-              <a:lnSpc>
-                <a:spcPct val="117000"/>
-              </a:lnSpc>
-            </a:pPr>
-            <a:r>
-              <a:rPr lang="en-GB" sz="2400" b="1" dirty="0">
-                <a:latin typeface="Suisse Int'l Semi Bold" panose="020B0804000000000000" pitchFamily="34" charset="77"/>
-              </a:rPr>
-              <a:t>Data sparsity problem</a:t>
-            </a:r>
-            <a:r>
-              <a:rPr lang="en-GB" sz="2400" dirty="0">
-                <a:latin typeface="Suisse Int'l" panose="020B0804000000000000" pitchFamily="34" charset="77"/>
-              </a:rPr>
-              <a:t>: a lot of data in aggregate, but very few data points for each individual user</a:t>
-            </a:r>
-          </a:p>
-          <a:p>
-            <a:pPr>
-              <a:lnSpc>
-                <a:spcPct val="117000"/>
-              </a:lnSpc>
-            </a:pPr>
-            <a:r>
-              <a:rPr lang="en-GB" sz="2400" dirty="0">
-                <a:latin typeface="Suisse Int'l" panose="020B0804000000000000" pitchFamily="34" charset="77"/>
-              </a:rPr>
-              <a:t>Promising hybrid AI approach: graph-learning recommender systems (GLRS) (Zhang et al., 2023) </a:t>
-            </a:r>
-          </a:p>
-        </p:txBody>
-      </p:sp>
-    </p:spTree>
-    <p:extLst>
-      <p:ext uri="{BB962C8B-B14F-4D97-AF65-F5344CB8AC3E}">
-        <p14:creationId xmlns:p14="http://schemas.microsoft.com/office/powerpoint/2010/main" val="1106523288"/>
-      </p:ext>
-    </p:extLst>
-  </p:cSld>
-  <p:clrMapOvr>
-    <a:masterClrMapping/>
-  </p:clrMapOvr>
-</p:sld>
-</file>
-
-<file path=ppt/slides/slide11.xml><?xml version="1.0" encoding="utf-8"?>
-<p:sld xmlns:a="http://schemas.openxmlformats.org/drawingml/2006/main" xmlns:r="http://schemas.openxmlformats.org/officeDocument/2006/relationships" xmlns:p="http://schemas.openxmlformats.org/presentationml/2006/main">
-  <p:cSld>
-    <p:spTree>
-      <p:nvGrpSpPr>
-        <p:cNvPr id="1" name=""/>
-        <p:cNvGrpSpPr/>
-        <p:nvPr/>
-      </p:nvGrpSpPr>
-      <p:grpSpPr>
-        <a:xfrm>
-          <a:off x="0" y="0"/>
-          <a:ext cx="0" cy="0"/>
-          <a:chOff x="0" y="0"/>
-          <a:chExt cx="0" cy="0"/>
-        </a:xfrm>
-      </p:grpSpPr>
-      <p:sp>
-        <p:nvSpPr>
-          <p:cNvPr id="2" name="Title 1">
-            <a:extLst>
-              <a:ext uri="{FF2B5EF4-FFF2-40B4-BE49-F238E27FC236}">
-                <a16:creationId xmlns:a16="http://schemas.microsoft.com/office/drawing/2014/main" id="{C0622663-679C-370A-4B6D-51377AAE404F}"/>
-              </a:ext>
-            </a:extLst>
-          </p:cNvPr>
-          <p:cNvSpPr>
-            <a:spLocks noGrp="1"/>
-          </p:cNvSpPr>
-          <p:nvPr>
-            <p:ph type="title"/>
-          </p:nvPr>
-        </p:nvSpPr>
-        <p:spPr/>
-        <p:txBody>
-          <a:bodyPr vert="horz" lIns="91440" tIns="45720" rIns="91440" bIns="45720" rtlCol="0">
-            <a:normAutofit/>
-          </a:bodyPr>
-          <a:lstStyle/>
-          <a:p>
-            <a:pPr>
-              <a:lnSpc>
-                <a:spcPct val="130000"/>
-              </a:lnSpc>
-              <a:spcBef>
-                <a:spcPts val="1000"/>
-              </a:spcBef>
             </a:pPr>
             <a:r>
               <a:rPr lang="en-CH" sz="3600" b="1" dirty="0">
@@ -4772,7 +4580,7 @@
 </p:sld>
 </file>
 
-<file path=ppt/slides/slide12.xml><?xml version="1.0" encoding="utf-8"?>
+<file path=ppt/slides/slide11.xml><?xml version="1.0" encoding="utf-8"?>
 <p:sld xmlns:a="http://schemas.openxmlformats.org/drawingml/2006/main" xmlns:r="http://schemas.openxmlformats.org/officeDocument/2006/relationships" xmlns:p="http://schemas.openxmlformats.org/presentationml/2006/main">
   <p:cSld>
     <p:spTree>
@@ -5040,7 +4848,7 @@
 </p:sld>
 </file>
 
-<file path=ppt/slides/slide13.xml><?xml version="1.0" encoding="utf-8"?>
+<file path=ppt/slides/slide12.xml><?xml version="1.0" encoding="utf-8"?>
 <p:sld xmlns:a="http://schemas.openxmlformats.org/drawingml/2006/main" xmlns:r="http://schemas.openxmlformats.org/officeDocument/2006/relationships" xmlns:p="http://schemas.openxmlformats.org/presentationml/2006/main">
   <p:cSld>
     <p:spTree>
@@ -5637,7 +5445,7 @@
 </p:sld>
 </file>
 
-<file path=ppt/slides/slide14.xml><?xml version="1.0" encoding="utf-8"?>
+<file path=ppt/slides/slide13.xml><?xml version="1.0" encoding="utf-8"?>
 <p:sld xmlns:a="http://schemas.openxmlformats.org/drawingml/2006/main" xmlns:r="http://schemas.openxmlformats.org/officeDocument/2006/relationships" xmlns:p="http://schemas.openxmlformats.org/presentationml/2006/main">
   <p:cSld>
     <p:spTree>
@@ -5807,37 +5615,471 @@
       </p:sp>
       <p:pic>
         <p:nvPicPr>
-          <p:cNvPr id="3" name="Picture 2">
-            <a:extLst>
-              <a:ext uri="{FF2B5EF4-FFF2-40B4-BE49-F238E27FC236}">
-                <a16:creationId xmlns:a16="http://schemas.microsoft.com/office/drawing/2014/main" id="{FDA28828-F454-1709-DA40-E8C61DB4D10F}"/>
+          <p:cNvPr id="1026" name="Picture 2">
+            <a:extLst>
+              <a:ext uri="{FF2B5EF4-FFF2-40B4-BE49-F238E27FC236}">
+                <a16:creationId xmlns:a16="http://schemas.microsoft.com/office/drawing/2014/main" id="{F06F9794-8FE7-3E10-2AB0-871930545D82}"/>
               </a:ext>
             </a:extLst>
           </p:cNvPr>
           <p:cNvPicPr>
-            <a:picLocks noChangeAspect="1"/>
+            <a:picLocks noChangeAspect="1" noChangeArrowheads="1"/>
           </p:cNvPicPr>
           <p:nvPr/>
         </p:nvPicPr>
-        <p:blipFill rotWithShape="1">
-          <a:blip r:embed="rId3"/>
-          <a:srcRect l="4093" t="6465" r="4223"/>
-          <a:stretch/>
+        <p:blipFill>
+          <a:blip r:embed="rId3">
+            <a:extLst>
+              <a:ext uri="{28A0092B-C50C-407E-A947-70E740481C1C}">
+                <a14:useLocalDpi xmlns:a14="http://schemas.microsoft.com/office/drawing/2010/main" val="0"/>
+              </a:ext>
+            </a:extLst>
+          </a:blip>
+          <a:srcRect/>
+          <a:stretch>
+            <a:fillRect/>
+          </a:stretch>
         </p:blipFill>
-        <p:spPr>
+        <p:spPr bwMode="auto">
           <a:xfrm>
-            <a:off x="639471" y="3300984"/>
-            <a:ext cx="4548199" cy="3255799"/>
+            <a:off x="349547" y="3203987"/>
+            <a:ext cx="5162253" cy="3461265"/>
           </a:xfrm>
           <a:prstGeom prst="rect">
             <a:avLst/>
           </a:prstGeom>
+          <a:noFill/>
+          <a:extLst>
+            <a:ext uri="{909E8E84-426E-40DD-AFC4-6F175D3DCCD1}">
+              <a14:hiddenFill xmlns:a14="http://schemas.microsoft.com/office/drawing/2010/main">
+                <a:solidFill>
+                  <a:srgbClr val="FFFFFF"/>
+                </a:solidFill>
+              </a14:hiddenFill>
+            </a:ext>
+          </a:extLst>
         </p:spPr>
       </p:pic>
     </p:spTree>
     <p:extLst>
       <p:ext uri="{BB962C8B-B14F-4D97-AF65-F5344CB8AC3E}">
         <p14:creationId xmlns:p14="http://schemas.microsoft.com/office/powerpoint/2010/main" val="2967206212"/>
+      </p:ext>
+    </p:extLst>
+  </p:cSld>
+  <p:clrMapOvr>
+    <a:masterClrMapping/>
+  </p:clrMapOvr>
+</p:sld>
+</file>
+
+<file path=ppt/slides/slide14.xml><?xml version="1.0" encoding="utf-8"?>
+<p:sld xmlns:a="http://schemas.openxmlformats.org/drawingml/2006/main" xmlns:r="http://schemas.openxmlformats.org/officeDocument/2006/relationships" xmlns:p="http://schemas.openxmlformats.org/presentationml/2006/main">
+  <p:cSld>
+    <p:spTree>
+      <p:nvGrpSpPr>
+        <p:cNvPr id="1" name=""/>
+        <p:cNvGrpSpPr/>
+        <p:nvPr/>
+      </p:nvGrpSpPr>
+      <p:grpSpPr>
+        <a:xfrm>
+          <a:off x="0" y="0"/>
+          <a:ext cx="0" cy="0"/>
+          <a:chOff x="0" y="0"/>
+          <a:chExt cx="0" cy="0"/>
+        </a:xfrm>
+      </p:grpSpPr>
+      <p:sp>
+        <p:nvSpPr>
+          <p:cNvPr id="2" name="Title 1">
+            <a:extLst>
+              <a:ext uri="{FF2B5EF4-FFF2-40B4-BE49-F238E27FC236}">
+                <a16:creationId xmlns:a16="http://schemas.microsoft.com/office/drawing/2014/main" id="{C0622663-679C-370A-4B6D-51377AAE404F}"/>
+              </a:ext>
+            </a:extLst>
+          </p:cNvPr>
+          <p:cNvSpPr>
+            <a:spLocks noGrp="1"/>
+          </p:cNvSpPr>
+          <p:nvPr>
+            <p:ph type="title"/>
+          </p:nvPr>
+        </p:nvSpPr>
+        <p:spPr/>
+        <p:txBody>
+          <a:bodyPr vert="horz" lIns="91440" tIns="45720" rIns="91440" bIns="45720" rtlCol="0">
+            <a:normAutofit/>
+          </a:bodyPr>
+          <a:lstStyle/>
+          <a:p>
+            <a:pPr>
+              <a:lnSpc>
+                <a:spcPct val="130000"/>
+              </a:lnSpc>
+              <a:spcBef>
+                <a:spcPts val="1000"/>
+              </a:spcBef>
+              <a:buFont typeface="Arial" panose="020B0604020202020204" pitchFamily="34" charset="0"/>
+            </a:pPr>
+            <a:r>
+              <a:rPr lang="en-CH" sz="3600" b="1">
+                <a:latin typeface="Book Antiqua" panose="02040602050305030304" pitchFamily="18" charset="0"/>
+                <a:ea typeface="+mn-ea"/>
+                <a:cs typeface="+mn-cs"/>
+              </a:rPr>
+              <a:t>The Promise of Broad AI</a:t>
+            </a:r>
+            <a:endParaRPr lang="en-CH" sz="3600" b="1" dirty="0">
+              <a:latin typeface="Book Antiqua" panose="02040602050305030304" pitchFamily="18" charset="0"/>
+              <a:ea typeface="+mn-ea"/>
+              <a:cs typeface="+mn-cs"/>
+            </a:endParaRPr>
+          </a:p>
+        </p:txBody>
+      </p:sp>
+      <p:sp>
+        <p:nvSpPr>
+          <p:cNvPr id="4" name="Content Placeholder 2">
+            <a:extLst>
+              <a:ext uri="{FF2B5EF4-FFF2-40B4-BE49-F238E27FC236}">
+                <a16:creationId xmlns:a16="http://schemas.microsoft.com/office/drawing/2014/main" id="{99BF1C80-9D6F-2A0D-0385-35E25EFEA5C8}"/>
+              </a:ext>
+            </a:extLst>
+          </p:cNvPr>
+          <p:cNvSpPr txBox="1">
+            <a:spLocks/>
+          </p:cNvSpPr>
+          <p:nvPr/>
+        </p:nvSpPr>
+        <p:spPr>
+          <a:xfrm>
+            <a:off x="838200" y="1825625"/>
+            <a:ext cx="10515600" cy="4351338"/>
+          </a:xfrm>
+          <a:prstGeom prst="rect">
+            <a:avLst/>
+          </a:prstGeom>
+          <a:noFill/>
+        </p:spPr>
+        <p:txBody>
+          <a:bodyPr vert="horz" lIns="91440" tIns="45720" rIns="91440" bIns="45720" rtlCol="0">
+            <a:normAutofit/>
+          </a:bodyPr>
+          <a:lstStyle>
+            <a:lvl1pPr marL="228600" indent="-228600" algn="l" defTabSz="914400" rtl="0" eaLnBrk="1" latinLnBrk="0" hangingPunct="1">
+              <a:lnSpc>
+                <a:spcPct val="90000"/>
+              </a:lnSpc>
+              <a:spcBef>
+                <a:spcPts val="1000"/>
+              </a:spcBef>
+              <a:buFont typeface="Arial" panose="020B0604020202020204" pitchFamily="34" charset="0"/>
+              <a:buChar char="•"/>
+              <a:defRPr sz="2800" kern="1200">
+                <a:solidFill>
+                  <a:schemeClr val="tx1"/>
+                </a:solidFill>
+                <a:latin typeface="+mn-lt"/>
+                <a:ea typeface="+mn-ea"/>
+                <a:cs typeface="+mn-cs"/>
+              </a:defRPr>
+            </a:lvl1pPr>
+            <a:lvl2pPr marL="685800" indent="-228600" algn="l" defTabSz="914400" rtl="0" eaLnBrk="1" latinLnBrk="0" hangingPunct="1">
+              <a:lnSpc>
+                <a:spcPct val="90000"/>
+              </a:lnSpc>
+              <a:spcBef>
+                <a:spcPts val="500"/>
+              </a:spcBef>
+              <a:buFont typeface="Arial" panose="020B0604020202020204" pitchFamily="34" charset="0"/>
+              <a:buChar char="•"/>
+              <a:defRPr sz="2400" kern="1200">
+                <a:solidFill>
+                  <a:schemeClr val="tx1"/>
+                </a:solidFill>
+                <a:latin typeface="+mn-lt"/>
+                <a:ea typeface="+mn-ea"/>
+                <a:cs typeface="+mn-cs"/>
+              </a:defRPr>
+            </a:lvl2pPr>
+            <a:lvl3pPr marL="1143000" indent="-228600" algn="l" defTabSz="914400" rtl="0" eaLnBrk="1" latinLnBrk="0" hangingPunct="1">
+              <a:lnSpc>
+                <a:spcPct val="90000"/>
+              </a:lnSpc>
+              <a:spcBef>
+                <a:spcPts val="500"/>
+              </a:spcBef>
+              <a:buFont typeface="Arial" panose="020B0604020202020204" pitchFamily="34" charset="0"/>
+              <a:buChar char="•"/>
+              <a:defRPr sz="2000" kern="1200">
+                <a:solidFill>
+                  <a:schemeClr val="tx1"/>
+                </a:solidFill>
+                <a:latin typeface="+mn-lt"/>
+                <a:ea typeface="+mn-ea"/>
+                <a:cs typeface="+mn-cs"/>
+              </a:defRPr>
+            </a:lvl3pPr>
+            <a:lvl4pPr marL="1600200" indent="-228600" algn="l" defTabSz="914400" rtl="0" eaLnBrk="1" latinLnBrk="0" hangingPunct="1">
+              <a:lnSpc>
+                <a:spcPct val="90000"/>
+              </a:lnSpc>
+              <a:spcBef>
+                <a:spcPts val="500"/>
+              </a:spcBef>
+              <a:buFont typeface="Arial" panose="020B0604020202020204" pitchFamily="34" charset="0"/>
+              <a:buChar char="•"/>
+              <a:defRPr sz="1800" kern="1200">
+                <a:solidFill>
+                  <a:schemeClr val="tx1"/>
+                </a:solidFill>
+                <a:latin typeface="+mn-lt"/>
+                <a:ea typeface="+mn-ea"/>
+                <a:cs typeface="+mn-cs"/>
+              </a:defRPr>
+            </a:lvl4pPr>
+            <a:lvl5pPr marL="2057400" indent="-228600" algn="l" defTabSz="914400" rtl="0" eaLnBrk="1" latinLnBrk="0" hangingPunct="1">
+              <a:lnSpc>
+                <a:spcPct val="90000"/>
+              </a:lnSpc>
+              <a:spcBef>
+                <a:spcPts val="500"/>
+              </a:spcBef>
+              <a:buFont typeface="Arial" panose="020B0604020202020204" pitchFamily="34" charset="0"/>
+              <a:buChar char="•"/>
+              <a:defRPr sz="1800" kern="1200">
+                <a:solidFill>
+                  <a:schemeClr val="tx1"/>
+                </a:solidFill>
+                <a:latin typeface="+mn-lt"/>
+                <a:ea typeface="+mn-ea"/>
+                <a:cs typeface="+mn-cs"/>
+              </a:defRPr>
+            </a:lvl5pPr>
+            <a:lvl6pPr marL="2514600" indent="-228600" algn="l" defTabSz="914400" rtl="0" eaLnBrk="1" latinLnBrk="0" hangingPunct="1">
+              <a:lnSpc>
+                <a:spcPct val="90000"/>
+              </a:lnSpc>
+              <a:spcBef>
+                <a:spcPts val="500"/>
+              </a:spcBef>
+              <a:buFont typeface="Arial" panose="020B0604020202020204" pitchFamily="34" charset="0"/>
+              <a:buChar char="•"/>
+              <a:defRPr sz="1800" kern="1200">
+                <a:solidFill>
+                  <a:schemeClr val="tx1"/>
+                </a:solidFill>
+                <a:latin typeface="+mn-lt"/>
+                <a:ea typeface="+mn-ea"/>
+                <a:cs typeface="+mn-cs"/>
+              </a:defRPr>
+            </a:lvl6pPr>
+            <a:lvl7pPr marL="2971800" indent="-228600" algn="l" defTabSz="914400" rtl="0" eaLnBrk="1" latinLnBrk="0" hangingPunct="1">
+              <a:lnSpc>
+                <a:spcPct val="90000"/>
+              </a:lnSpc>
+              <a:spcBef>
+                <a:spcPts val="500"/>
+              </a:spcBef>
+              <a:buFont typeface="Arial" panose="020B0604020202020204" pitchFamily="34" charset="0"/>
+              <a:buChar char="•"/>
+              <a:defRPr sz="1800" kern="1200">
+                <a:solidFill>
+                  <a:schemeClr val="tx1"/>
+                </a:solidFill>
+                <a:latin typeface="+mn-lt"/>
+                <a:ea typeface="+mn-ea"/>
+                <a:cs typeface="+mn-cs"/>
+              </a:defRPr>
+            </a:lvl7pPr>
+            <a:lvl8pPr marL="3429000" indent="-228600" algn="l" defTabSz="914400" rtl="0" eaLnBrk="1" latinLnBrk="0" hangingPunct="1">
+              <a:lnSpc>
+                <a:spcPct val="90000"/>
+              </a:lnSpc>
+              <a:spcBef>
+                <a:spcPts val="500"/>
+              </a:spcBef>
+              <a:buFont typeface="Arial" panose="020B0604020202020204" pitchFamily="34" charset="0"/>
+              <a:buChar char="•"/>
+              <a:defRPr sz="1800" kern="1200">
+                <a:solidFill>
+                  <a:schemeClr val="tx1"/>
+                </a:solidFill>
+                <a:latin typeface="+mn-lt"/>
+                <a:ea typeface="+mn-ea"/>
+                <a:cs typeface="+mn-cs"/>
+              </a:defRPr>
+            </a:lvl8pPr>
+            <a:lvl9pPr marL="3886200" indent="-228600" algn="l" defTabSz="914400" rtl="0" eaLnBrk="1" latinLnBrk="0" hangingPunct="1">
+              <a:lnSpc>
+                <a:spcPct val="90000"/>
+              </a:lnSpc>
+              <a:spcBef>
+                <a:spcPts val="500"/>
+              </a:spcBef>
+              <a:buFont typeface="Arial" panose="020B0604020202020204" pitchFamily="34" charset="0"/>
+              <a:buChar char="•"/>
+              <a:defRPr sz="1800" kern="1200">
+                <a:solidFill>
+                  <a:schemeClr val="tx1"/>
+                </a:solidFill>
+                <a:latin typeface="+mn-lt"/>
+                <a:ea typeface="+mn-ea"/>
+                <a:cs typeface="+mn-cs"/>
+              </a:defRPr>
+            </a:lvl9pPr>
+          </a:lstStyle>
+          <a:p>
+            <a:pPr marL="0" indent="0">
+              <a:lnSpc>
+                <a:spcPct val="117000"/>
+              </a:lnSpc>
+              <a:buNone/>
+            </a:pPr>
+            <a:r>
+              <a:rPr lang="en-GB" sz="1800" dirty="0">
+                <a:latin typeface="Suisse Int'l Light Italic" panose="020B0304000000000000" pitchFamily="34" charset="-78"/>
+                <a:cs typeface="Suisse Int'l Light Italic" panose="020B0304000000000000" pitchFamily="34" charset="-78"/>
+              </a:rPr>
+              <a:t>Train-then-fine-tune</a:t>
+            </a:r>
+          </a:p>
+          <a:p>
+            <a:pPr>
+              <a:lnSpc>
+                <a:spcPct val="117000"/>
+              </a:lnSpc>
+              <a:buFontTx/>
+              <a:buChar char="-"/>
+            </a:pPr>
+            <a:r>
+              <a:rPr lang="en-GB" sz="1800" dirty="0">
+                <a:latin typeface="Suisse Int'l" panose="020B0804000000000000" pitchFamily="34" charset="77"/>
+                <a:cs typeface="Suisse Int'l Light Italic" panose="020B0304000000000000" pitchFamily="34" charset="-78"/>
+              </a:rPr>
+              <a:t>Pre-train large base model (base model for text, base model for image recognition, base model for video sequence analysis, etc.)</a:t>
+            </a:r>
+          </a:p>
+          <a:p>
+            <a:pPr>
+              <a:lnSpc>
+                <a:spcPct val="117000"/>
+              </a:lnSpc>
+              <a:buFontTx/>
+              <a:buChar char="-"/>
+            </a:pPr>
+            <a:r>
+              <a:rPr lang="en-GB" sz="1800" dirty="0">
+                <a:latin typeface="Suisse Int'l" panose="020B0804000000000000" pitchFamily="34" charset="77"/>
+                <a:cs typeface="Suisse Int'l Light Italic" panose="020B0304000000000000" pitchFamily="34" charset="-78"/>
+              </a:rPr>
+              <a:t>Fine-tune model to specific use cases with few examples only</a:t>
+            </a:r>
+          </a:p>
+          <a:p>
+            <a:pPr>
+              <a:lnSpc>
+                <a:spcPct val="117000"/>
+              </a:lnSpc>
+              <a:buFontTx/>
+              <a:buChar char="-"/>
+            </a:pPr>
+            <a:r>
+              <a:rPr lang="en-GB" sz="1800" dirty="0">
+                <a:latin typeface="Suisse Int'l" panose="020B0804000000000000" pitchFamily="34" charset="77"/>
+                <a:cs typeface="Suisse Int'l Light Italic" panose="020B0304000000000000" pitchFamily="34" charset="-78"/>
+              </a:rPr>
+              <a:t>Fine-tune model to specific user with few examples only</a:t>
+            </a:r>
+          </a:p>
+          <a:p>
+            <a:pPr>
+              <a:lnSpc>
+                <a:spcPct val="117000"/>
+              </a:lnSpc>
+              <a:buFontTx/>
+              <a:buChar char="-"/>
+            </a:pPr>
+            <a:endParaRPr lang="en-GB" sz="1800" dirty="0">
+              <a:latin typeface="Suisse Int'l" panose="020B0804000000000000" pitchFamily="34" charset="77"/>
+            </a:endParaRPr>
+          </a:p>
+          <a:p>
+            <a:pPr marL="0" indent="0">
+              <a:lnSpc>
+                <a:spcPct val="117000"/>
+              </a:lnSpc>
+              <a:buNone/>
+            </a:pPr>
+            <a:r>
+              <a:rPr lang="en-GB" sz="1800" dirty="0">
+                <a:latin typeface="Suisse Int'l Italic" panose="020B0804000000000000" pitchFamily="34" charset="77"/>
+              </a:rPr>
+              <a:t> </a:t>
+            </a:r>
+            <a:r>
+              <a:rPr lang="en-GB" sz="1800" dirty="0">
+                <a:latin typeface="Suisse Int'l Light Italic" panose="020B0304000000000000" pitchFamily="34" charset="-78"/>
+                <a:cs typeface="Suisse Int'l Light Italic" panose="020B0304000000000000" pitchFamily="34" charset="-78"/>
+              </a:rPr>
+              <a:t>Prompt-based learning (see, e.g., Zhou et al., 2023)</a:t>
+            </a:r>
+          </a:p>
+          <a:p>
+            <a:pPr>
+              <a:lnSpc>
+                <a:spcPct val="117000"/>
+              </a:lnSpc>
+              <a:buFontTx/>
+              <a:buChar char="-"/>
+            </a:pPr>
+            <a:r>
+              <a:rPr lang="en-GB" sz="1800" dirty="0">
+                <a:latin typeface="Suisse Int'l" panose="020B0804000000000000" pitchFamily="34" charset="77"/>
+                <a:cs typeface="Suisse Int'l Light Italic" panose="020B0304000000000000" pitchFamily="34" charset="-78"/>
+              </a:rPr>
+              <a:t>user gives an example or two (context)</a:t>
+            </a:r>
+          </a:p>
+          <a:p>
+            <a:pPr>
+              <a:lnSpc>
+                <a:spcPct val="117000"/>
+              </a:lnSpc>
+              <a:buFontTx/>
+              <a:buChar char="-"/>
+            </a:pPr>
+            <a:r>
+              <a:rPr lang="en-GB" sz="1800" dirty="0">
+                <a:latin typeface="Suisse Int'l" panose="020B0804000000000000" pitchFamily="34" charset="77"/>
+                <a:cs typeface="Suisse Int'l Light Italic" panose="020B0304000000000000" pitchFamily="34" charset="-78"/>
+              </a:rPr>
+              <a:t>AI adapts based on example in context</a:t>
+            </a:r>
+          </a:p>
+          <a:p>
+            <a:pPr>
+              <a:lnSpc>
+                <a:spcPct val="117000"/>
+              </a:lnSpc>
+              <a:buFontTx/>
+              <a:buChar char="-"/>
+            </a:pPr>
+            <a:r>
+              <a:rPr lang="en-GB" sz="1800" dirty="0">
+                <a:latin typeface="Suisse Int'l" panose="020B0804000000000000" pitchFamily="34" charset="77"/>
+                <a:cs typeface="Suisse Int'l Light Italic" panose="020B0304000000000000" pitchFamily="34" charset="-78"/>
+              </a:rPr>
+              <a:t>(context in GPT3: 2K tokens, ChatGPT: 4K tokens, GPT4: 8k tokens, GPT4-32K: 32K tokens)</a:t>
+            </a:r>
+          </a:p>
+        </p:txBody>
+      </p:sp>
+    </p:spTree>
+    <p:extLst>
+      <p:ext uri="{BB962C8B-B14F-4D97-AF65-F5344CB8AC3E}">
+        <p14:creationId xmlns:p14="http://schemas.microsoft.com/office/powerpoint/2010/main" val="1849211441"/>
       </p:ext>
     </p:extLst>
   </p:cSld>
@@ -5897,18 +6139,13 @@
               <a:buFont typeface="Arial" panose="020B0604020202020204" pitchFamily="34" charset="0"/>
             </a:pPr>
             <a:r>
-              <a:rPr lang="en-CH" sz="3600" b="1">
+              <a:rPr lang="en-CH" sz="3600" b="1" dirty="0">
                 <a:latin typeface="Book Antiqua" panose="02040602050305030304" pitchFamily="18" charset="0"/>
                 <a:ea typeface="+mn-ea"/>
                 <a:cs typeface="+mn-cs"/>
               </a:rPr>
-              <a:t>The Promise of Broad AI</a:t>
-            </a:r>
-            <a:endParaRPr lang="en-CH" sz="3600" b="1" dirty="0">
-              <a:latin typeface="Book Antiqua" panose="02040602050305030304" pitchFamily="18" charset="0"/>
-              <a:ea typeface="+mn-ea"/>
-              <a:cs typeface="+mn-cs"/>
-            </a:endParaRPr>
+              <a:t>Tokens &amp; Context</a:t>
+            </a:r>
           </a:p>
         </p:txBody>
       </p:sp>
@@ -5928,8 +6165,8 @@
         </p:nvSpPr>
         <p:spPr>
           <a:xfrm>
-            <a:off x="838200" y="1825625"/>
-            <a:ext cx="10515600" cy="4351338"/>
+            <a:off x="838200" y="3968015"/>
+            <a:ext cx="10515600" cy="2398593"/>
           </a:xfrm>
           <a:prstGeom prst="rect">
             <a:avLst/>
@@ -6112,11 +6349,11 @@
               <a:buNone/>
             </a:pPr>
             <a:r>
-              <a:rPr lang="en-GB" sz="1800" dirty="0">
-                <a:latin typeface="Suisse Int'l Light Italic" panose="020B0304000000000000" pitchFamily="34" charset="-78"/>
+              <a:rPr lang="en-GB" sz="2000" dirty="0">
+                <a:latin typeface="Suisse Int'l" panose="020B0804000000000000" pitchFamily="34" charset="77"/>
                 <a:cs typeface="Suisse Int'l Light Italic" panose="020B0304000000000000" pitchFamily="34" charset="-78"/>
               </a:rPr>
-              <a:t>Train-then-fine-tune</a:t>
+              <a:t>What to put into the context?</a:t>
             </a:r>
           </a:p>
           <a:p>
@@ -6124,15 +6361,13 @@
               <a:lnSpc>
                 <a:spcPct val="117000"/>
               </a:lnSpc>
-              <a:buFontTx/>
-              <a:buChar char="-"/>
-            </a:pPr>
-            <a:r>
-              <a:rPr lang="en-GB" sz="1800" dirty="0">
+            </a:pPr>
+            <a:r>
+              <a:rPr lang="en-GB" sz="2000" dirty="0">
                 <a:latin typeface="Suisse Int'l" panose="020B0804000000000000" pitchFamily="34" charset="77"/>
                 <a:cs typeface="Suisse Int'l Light Italic" panose="020B0304000000000000" pitchFamily="34" charset="-78"/>
               </a:rPr>
-              <a:t>Pre-train large base model (base model for text, base model for image recognition, base model for video sequence analysis, etc.)</a:t>
+              <a:t>New emerging discipline of “Prompt Engineering”</a:t>
             </a:r>
           </a:p>
           <a:p>
@@ -6140,195 +6375,51 @@
               <a:lnSpc>
                 <a:spcPct val="117000"/>
               </a:lnSpc>
-              <a:buFontTx/>
-              <a:buChar char="-"/>
-            </a:pPr>
-            <a:r>
-              <a:rPr lang="en-GB" sz="1800" dirty="0">
+            </a:pPr>
+            <a:r>
+              <a:rPr lang="en-GB" sz="2000" dirty="0">
                 <a:latin typeface="Suisse Int'l" panose="020B0804000000000000" pitchFamily="34" charset="77"/>
                 <a:cs typeface="Suisse Int'l Light Italic" panose="020B0304000000000000" pitchFamily="34" charset="-78"/>
               </a:rPr>
-              <a:t>Fine-tune model to specific use cases with few examples only</a:t>
-            </a:r>
-          </a:p>
-          <a:p>
-            <a:pPr>
-              <a:lnSpc>
-                <a:spcPct val="117000"/>
-              </a:lnSpc>
-              <a:buFontTx/>
-              <a:buChar char="-"/>
-            </a:pPr>
-            <a:r>
-              <a:rPr lang="en-GB" sz="1800" dirty="0">
-                <a:latin typeface="Suisse Int'l" panose="020B0804000000000000" pitchFamily="34" charset="77"/>
+              <a:t>Users may need to learn completely new strategies such as </a:t>
+            </a:r>
+            <a:r>
+              <a:rPr lang="en-GB" sz="2000" dirty="0">
+                <a:latin typeface="Suisse Int'l Book Italic" panose="020B0804000000000000" pitchFamily="34" charset="77"/>
                 <a:cs typeface="Suisse Int'l Light Italic" panose="020B0304000000000000" pitchFamily="34" charset="-78"/>
               </a:rPr>
-              <a:t>Fine-tune model to specific user with few examples only</a:t>
-            </a:r>
-          </a:p>
-          <a:p>
-            <a:pPr>
-              <a:lnSpc>
-                <a:spcPct val="117000"/>
-              </a:lnSpc>
-              <a:buFontTx/>
-              <a:buChar char="-"/>
-            </a:pPr>
-            <a:endParaRPr lang="en-GB" sz="1800" dirty="0">
-              <a:latin typeface="Suisse Int'l" panose="020B0804000000000000" pitchFamily="34" charset="77"/>
-            </a:endParaRPr>
-          </a:p>
-          <a:p>
-            <a:pPr marL="0" indent="0">
-              <a:lnSpc>
-                <a:spcPct val="117000"/>
-              </a:lnSpc>
-              <a:buNone/>
-            </a:pPr>
-            <a:r>
-              <a:rPr lang="en-GB" sz="1800" dirty="0">
-                <a:latin typeface="Suisse Int'l Italic" panose="020B0804000000000000" pitchFamily="34" charset="77"/>
-              </a:rPr>
-              <a:t> </a:t>
-            </a:r>
-            <a:r>
-              <a:rPr lang="en-GB" sz="1800" dirty="0">
-                <a:latin typeface="Suisse Int'l Light Italic" panose="020B0304000000000000" pitchFamily="34" charset="-78"/>
+              <a:t>chain of thought </a:t>
+            </a:r>
+            <a:r>
+              <a:rPr lang="en-GB" sz="2000" dirty="0">
+                <a:latin typeface="Suisse Int'l" panose="020B0804000000000000" pitchFamily="34" charset="77"/>
                 <a:cs typeface="Suisse Int'l Light Italic" panose="020B0304000000000000" pitchFamily="34" charset="-78"/>
               </a:rPr>
-              <a:t>Prompt-based learning (see, e.g., Zhou et al., 2023)</a:t>
-            </a:r>
-          </a:p>
-          <a:p>
-            <a:pPr>
-              <a:lnSpc>
-                <a:spcPct val="117000"/>
-              </a:lnSpc>
-              <a:buFontTx/>
-              <a:buChar char="-"/>
-            </a:pPr>
-            <a:r>
-              <a:rPr lang="en-GB" sz="1800" dirty="0">
-                <a:latin typeface="Suisse Int'l" panose="020B0804000000000000" pitchFamily="34" charset="77"/>
+              <a:t>prompting (Wei et al., 2023) and </a:t>
+            </a:r>
+            <a:r>
+              <a:rPr lang="en-GB" sz="2000" dirty="0">
+                <a:latin typeface="Suisse Int'l Book Italic" panose="020B0804000000000000" pitchFamily="34" charset="77"/>
                 <a:cs typeface="Suisse Int'l Light Italic" panose="020B0304000000000000" pitchFamily="34" charset="-78"/>
               </a:rPr>
-              <a:t>user gives an example or two (context)</a:t>
-            </a:r>
-          </a:p>
-          <a:p>
-            <a:pPr>
-              <a:lnSpc>
-                <a:spcPct val="117000"/>
-              </a:lnSpc>
-              <a:buFontTx/>
-              <a:buChar char="-"/>
-            </a:pPr>
-            <a:r>
-              <a:rPr lang="en-GB" sz="1800" dirty="0">
+              <a:t>least-to-most prompting </a:t>
+            </a:r>
+            <a:r>
+              <a:rPr lang="en-GB" sz="2000" dirty="0">
                 <a:latin typeface="Suisse Int'l" panose="020B0804000000000000" pitchFamily="34" charset="77"/>
                 <a:cs typeface="Suisse Int'l Light Italic" panose="020B0304000000000000" pitchFamily="34" charset="-78"/>
               </a:rPr>
-              <a:t>AI adapts based on example in context</a:t>
-            </a:r>
-          </a:p>
-          <a:p>
-            <a:pPr>
-              <a:lnSpc>
-                <a:spcPct val="117000"/>
-              </a:lnSpc>
-              <a:buFontTx/>
-              <a:buChar char="-"/>
-            </a:pPr>
-            <a:r>
-              <a:rPr lang="en-GB" sz="1800" dirty="0">
-                <a:latin typeface="Suisse Int'l" panose="020B0804000000000000" pitchFamily="34" charset="77"/>
-                <a:cs typeface="Suisse Int'l Light Italic" panose="020B0304000000000000" pitchFamily="34" charset="-78"/>
-              </a:rPr>
-              <a:t>(context in GPT3: 2K tokens, ChatGPT: 4K tokens, GPT4: 8k tokens, GPT4-32K: 32K tokens)</a:t>
-            </a:r>
-          </a:p>
-        </p:txBody>
-      </p:sp>
-    </p:spTree>
-    <p:extLst>
-      <p:ext uri="{BB962C8B-B14F-4D97-AF65-F5344CB8AC3E}">
-        <p14:creationId xmlns:p14="http://schemas.microsoft.com/office/powerpoint/2010/main" val="1849211441"/>
-      </p:ext>
-    </p:extLst>
-  </p:cSld>
-  <p:clrMapOvr>
-    <a:masterClrMapping/>
-  </p:clrMapOvr>
-</p:sld>
-</file>
-
-<file path=ppt/slides/slide16.xml><?xml version="1.0" encoding="utf-8"?>
-<p:sld xmlns:a="http://schemas.openxmlformats.org/drawingml/2006/main" xmlns:r="http://schemas.openxmlformats.org/officeDocument/2006/relationships" xmlns:p="http://schemas.openxmlformats.org/presentationml/2006/main">
-  <p:cSld>
-    <p:spTree>
-      <p:nvGrpSpPr>
-        <p:cNvPr id="1" name=""/>
-        <p:cNvGrpSpPr/>
-        <p:nvPr/>
-      </p:nvGrpSpPr>
-      <p:grpSpPr>
-        <a:xfrm>
-          <a:off x="0" y="0"/>
-          <a:ext cx="0" cy="0"/>
-          <a:chOff x="0" y="0"/>
-          <a:chExt cx="0" cy="0"/>
-        </a:xfrm>
-      </p:grpSpPr>
-      <p:sp>
-        <p:nvSpPr>
-          <p:cNvPr id="2" name="Title 1">
-            <a:extLst>
-              <a:ext uri="{FF2B5EF4-FFF2-40B4-BE49-F238E27FC236}">
-                <a16:creationId xmlns:a16="http://schemas.microsoft.com/office/drawing/2014/main" id="{C0622663-679C-370A-4B6D-51377AAE404F}"/>
-              </a:ext>
-            </a:extLst>
-          </p:cNvPr>
-          <p:cNvSpPr>
-            <a:spLocks noGrp="1"/>
-          </p:cNvSpPr>
-          <p:nvPr>
-            <p:ph type="title"/>
-          </p:nvPr>
-        </p:nvSpPr>
-        <p:spPr/>
-        <p:txBody>
-          <a:bodyPr vert="horz" lIns="91440" tIns="45720" rIns="91440" bIns="45720" rtlCol="0">
-            <a:normAutofit/>
-          </a:bodyPr>
-          <a:lstStyle/>
-          <a:p>
-            <a:pPr>
-              <a:lnSpc>
-                <a:spcPct val="130000"/>
-              </a:lnSpc>
-              <a:spcBef>
-                <a:spcPts val="1000"/>
-              </a:spcBef>
-              <a:buFont typeface="Arial" panose="020B0604020202020204" pitchFamily="34" charset="0"/>
-            </a:pPr>
-            <a:r>
-              <a:rPr lang="en-CH" sz="3600" b="1" dirty="0">
-                <a:latin typeface="Book Antiqua" panose="02040602050305030304" pitchFamily="18" charset="0"/>
-                <a:ea typeface="+mn-ea"/>
-                <a:cs typeface="+mn-cs"/>
-              </a:rPr>
-              <a:t>Tokens &amp; Context</a:t>
-            </a:r>
-          </a:p>
-        </p:txBody>
-      </p:sp>
-      <p:sp>
-        <p:nvSpPr>
-          <p:cNvPr id="4" name="Content Placeholder 2">
-            <a:extLst>
-              <a:ext uri="{FF2B5EF4-FFF2-40B4-BE49-F238E27FC236}">
-                <a16:creationId xmlns:a16="http://schemas.microsoft.com/office/drawing/2014/main" id="{99BF1C80-9D6F-2A0D-0385-35E25EFEA5C8}"/>
+              <a:t>(Zhou et al., 2023)</a:t>
+            </a:r>
+          </a:p>
+        </p:txBody>
+      </p:sp>
+      <p:sp>
+        <p:nvSpPr>
+          <p:cNvPr id="3" name="Content Placeholder 2">
+            <a:extLst>
+              <a:ext uri="{FF2B5EF4-FFF2-40B4-BE49-F238E27FC236}">
+                <a16:creationId xmlns:a16="http://schemas.microsoft.com/office/drawing/2014/main" id="{FFB21B06-0A63-52FB-7F20-C7C306033141}"/>
               </a:ext>
             </a:extLst>
           </p:cNvPr>
@@ -6339,17 +6430,21 @@
         </p:nvSpPr>
         <p:spPr>
           <a:xfrm>
-            <a:off x="838200" y="3968015"/>
-            <a:ext cx="10515600" cy="2398593"/>
+            <a:off x="838200" y="1690688"/>
+            <a:ext cx="7627534" cy="1921192"/>
           </a:xfrm>
-          <a:prstGeom prst="rect">
-            <a:avLst/>
+          <a:prstGeom prst="roundRect">
+            <a:avLst>
+              <a:gd name="adj" fmla="val 24800"/>
+            </a:avLst>
           </a:prstGeom>
-          <a:noFill/>
+          <a:solidFill>
+            <a:schemeClr val="bg2"/>
+          </a:solidFill>
         </p:spPr>
         <p:txBody>
-          <a:bodyPr vert="horz" lIns="91440" tIns="45720" rIns="91440" bIns="45720" rtlCol="0">
-            <a:normAutofit/>
+          <a:bodyPr vert="horz" lIns="180000" tIns="108000" rIns="180000" bIns="108000" rtlCol="0">
+            <a:normAutofit fontScale="85000" lnSpcReduction="10000"/>
           </a:bodyPr>
           <a:lstStyle>
             <a:lvl1pPr marL="228600" indent="-228600" algn="l" defTabSz="914400" rtl="0" eaLnBrk="1" latinLnBrk="0" hangingPunct="1">
@@ -6518,275 +6613,6 @@
           <a:p>
             <a:pPr marL="0" indent="0">
               <a:lnSpc>
-                <a:spcPct val="117000"/>
-              </a:lnSpc>
-              <a:buNone/>
-            </a:pPr>
-            <a:r>
-              <a:rPr lang="en-GB" sz="2000" dirty="0">
-                <a:latin typeface="Suisse Int'l" panose="020B0804000000000000" pitchFamily="34" charset="77"/>
-                <a:cs typeface="Suisse Int'l Light Italic" panose="020B0304000000000000" pitchFamily="34" charset="-78"/>
-              </a:rPr>
-              <a:t>What to put into the context?</a:t>
-            </a:r>
-          </a:p>
-          <a:p>
-            <a:pPr>
-              <a:lnSpc>
-                <a:spcPct val="117000"/>
-              </a:lnSpc>
-            </a:pPr>
-            <a:r>
-              <a:rPr lang="en-GB" sz="2000" dirty="0">
-                <a:latin typeface="Suisse Int'l" panose="020B0804000000000000" pitchFamily="34" charset="77"/>
-                <a:cs typeface="Suisse Int'l Light Italic" panose="020B0304000000000000" pitchFamily="34" charset="-78"/>
-              </a:rPr>
-              <a:t>New emerging discipline of “Prompt Engineering”</a:t>
-            </a:r>
-          </a:p>
-          <a:p>
-            <a:pPr>
-              <a:lnSpc>
-                <a:spcPct val="117000"/>
-              </a:lnSpc>
-            </a:pPr>
-            <a:r>
-              <a:rPr lang="en-GB" sz="2000" dirty="0">
-                <a:latin typeface="Suisse Int'l" panose="020B0804000000000000" pitchFamily="34" charset="77"/>
-                <a:cs typeface="Suisse Int'l Light Italic" panose="020B0304000000000000" pitchFamily="34" charset="-78"/>
-              </a:rPr>
-              <a:t>Users may need to learn completely new strategies such as </a:t>
-            </a:r>
-            <a:r>
-              <a:rPr lang="en-GB" sz="2000" dirty="0">
-                <a:latin typeface="Suisse Int'l Book Italic" panose="020B0804000000000000" pitchFamily="34" charset="77"/>
-                <a:cs typeface="Suisse Int'l Light Italic" panose="020B0304000000000000" pitchFamily="34" charset="-78"/>
-              </a:rPr>
-              <a:t>chain of thought </a:t>
-            </a:r>
-            <a:r>
-              <a:rPr lang="en-GB" sz="2000" dirty="0">
-                <a:latin typeface="Suisse Int'l" panose="020B0804000000000000" pitchFamily="34" charset="77"/>
-                <a:cs typeface="Suisse Int'l Light Italic" panose="020B0304000000000000" pitchFamily="34" charset="-78"/>
-              </a:rPr>
-              <a:t>prompting (Wei et al., 2023) and </a:t>
-            </a:r>
-            <a:r>
-              <a:rPr lang="en-GB" sz="2000" dirty="0">
-                <a:latin typeface="Suisse Int'l Book Italic" panose="020B0804000000000000" pitchFamily="34" charset="77"/>
-                <a:cs typeface="Suisse Int'l Light Italic" panose="020B0304000000000000" pitchFamily="34" charset="-78"/>
-              </a:rPr>
-              <a:t>least-to-most prompting </a:t>
-            </a:r>
-            <a:r>
-              <a:rPr lang="en-GB" sz="2000" dirty="0">
-                <a:latin typeface="Suisse Int'l" panose="020B0804000000000000" pitchFamily="34" charset="77"/>
-                <a:cs typeface="Suisse Int'l Light Italic" panose="020B0304000000000000" pitchFamily="34" charset="-78"/>
-              </a:rPr>
-              <a:t>(Zhou et al., 2023)</a:t>
-            </a:r>
-          </a:p>
-        </p:txBody>
-      </p:sp>
-      <p:sp>
-        <p:nvSpPr>
-          <p:cNvPr id="3" name="Content Placeholder 2">
-            <a:extLst>
-              <a:ext uri="{FF2B5EF4-FFF2-40B4-BE49-F238E27FC236}">
-                <a16:creationId xmlns:a16="http://schemas.microsoft.com/office/drawing/2014/main" id="{FFB21B06-0A63-52FB-7F20-C7C306033141}"/>
-              </a:ext>
-            </a:extLst>
-          </p:cNvPr>
-          <p:cNvSpPr txBox="1">
-            <a:spLocks/>
-          </p:cNvSpPr>
-          <p:nvPr/>
-        </p:nvSpPr>
-        <p:spPr>
-          <a:xfrm>
-            <a:off x="838200" y="1690688"/>
-            <a:ext cx="7627534" cy="1921192"/>
-          </a:xfrm>
-          <a:prstGeom prst="roundRect">
-            <a:avLst>
-              <a:gd name="adj" fmla="val 24800"/>
-            </a:avLst>
-          </a:prstGeom>
-          <a:solidFill>
-            <a:schemeClr val="bg2"/>
-          </a:solidFill>
-        </p:spPr>
-        <p:txBody>
-          <a:bodyPr vert="horz" lIns="180000" tIns="108000" rIns="180000" bIns="108000" rtlCol="0">
-            <a:normAutofit fontScale="85000" lnSpcReduction="10000"/>
-          </a:bodyPr>
-          <a:lstStyle>
-            <a:lvl1pPr marL="228600" indent="-228600" algn="l" defTabSz="914400" rtl="0" eaLnBrk="1" latinLnBrk="0" hangingPunct="1">
-              <a:lnSpc>
-                <a:spcPct val="90000"/>
-              </a:lnSpc>
-              <a:spcBef>
-                <a:spcPts val="1000"/>
-              </a:spcBef>
-              <a:buFont typeface="Arial" panose="020B0604020202020204" pitchFamily="34" charset="0"/>
-              <a:buChar char="•"/>
-              <a:defRPr sz="2800" kern="1200">
-                <a:solidFill>
-                  <a:schemeClr val="tx1"/>
-                </a:solidFill>
-                <a:latin typeface="+mn-lt"/>
-                <a:ea typeface="+mn-ea"/>
-                <a:cs typeface="+mn-cs"/>
-              </a:defRPr>
-            </a:lvl1pPr>
-            <a:lvl2pPr marL="685800" indent="-228600" algn="l" defTabSz="914400" rtl="0" eaLnBrk="1" latinLnBrk="0" hangingPunct="1">
-              <a:lnSpc>
-                <a:spcPct val="90000"/>
-              </a:lnSpc>
-              <a:spcBef>
-                <a:spcPts val="500"/>
-              </a:spcBef>
-              <a:buFont typeface="Arial" panose="020B0604020202020204" pitchFamily="34" charset="0"/>
-              <a:buChar char="•"/>
-              <a:defRPr sz="2400" kern="1200">
-                <a:solidFill>
-                  <a:schemeClr val="tx1"/>
-                </a:solidFill>
-                <a:latin typeface="+mn-lt"/>
-                <a:ea typeface="+mn-ea"/>
-                <a:cs typeface="+mn-cs"/>
-              </a:defRPr>
-            </a:lvl2pPr>
-            <a:lvl3pPr marL="1143000" indent="-228600" algn="l" defTabSz="914400" rtl="0" eaLnBrk="1" latinLnBrk="0" hangingPunct="1">
-              <a:lnSpc>
-                <a:spcPct val="90000"/>
-              </a:lnSpc>
-              <a:spcBef>
-                <a:spcPts val="500"/>
-              </a:spcBef>
-              <a:buFont typeface="Arial" panose="020B0604020202020204" pitchFamily="34" charset="0"/>
-              <a:buChar char="•"/>
-              <a:defRPr sz="2000" kern="1200">
-                <a:solidFill>
-                  <a:schemeClr val="tx1"/>
-                </a:solidFill>
-                <a:latin typeface="+mn-lt"/>
-                <a:ea typeface="+mn-ea"/>
-                <a:cs typeface="+mn-cs"/>
-              </a:defRPr>
-            </a:lvl3pPr>
-            <a:lvl4pPr marL="1600200" indent="-228600" algn="l" defTabSz="914400" rtl="0" eaLnBrk="1" latinLnBrk="0" hangingPunct="1">
-              <a:lnSpc>
-                <a:spcPct val="90000"/>
-              </a:lnSpc>
-              <a:spcBef>
-                <a:spcPts val="500"/>
-              </a:spcBef>
-              <a:buFont typeface="Arial" panose="020B0604020202020204" pitchFamily="34" charset="0"/>
-              <a:buChar char="•"/>
-              <a:defRPr sz="1800" kern="1200">
-                <a:solidFill>
-                  <a:schemeClr val="tx1"/>
-                </a:solidFill>
-                <a:latin typeface="+mn-lt"/>
-                <a:ea typeface="+mn-ea"/>
-                <a:cs typeface="+mn-cs"/>
-              </a:defRPr>
-            </a:lvl4pPr>
-            <a:lvl5pPr marL="2057400" indent="-228600" algn="l" defTabSz="914400" rtl="0" eaLnBrk="1" latinLnBrk="0" hangingPunct="1">
-              <a:lnSpc>
-                <a:spcPct val="90000"/>
-              </a:lnSpc>
-              <a:spcBef>
-                <a:spcPts val="500"/>
-              </a:spcBef>
-              <a:buFont typeface="Arial" panose="020B0604020202020204" pitchFamily="34" charset="0"/>
-              <a:buChar char="•"/>
-              <a:defRPr sz="1800" kern="1200">
-                <a:solidFill>
-                  <a:schemeClr val="tx1"/>
-                </a:solidFill>
-                <a:latin typeface="+mn-lt"/>
-                <a:ea typeface="+mn-ea"/>
-                <a:cs typeface="+mn-cs"/>
-              </a:defRPr>
-            </a:lvl5pPr>
-            <a:lvl6pPr marL="2514600" indent="-228600" algn="l" defTabSz="914400" rtl="0" eaLnBrk="1" latinLnBrk="0" hangingPunct="1">
-              <a:lnSpc>
-                <a:spcPct val="90000"/>
-              </a:lnSpc>
-              <a:spcBef>
-                <a:spcPts val="500"/>
-              </a:spcBef>
-              <a:buFont typeface="Arial" panose="020B0604020202020204" pitchFamily="34" charset="0"/>
-              <a:buChar char="•"/>
-              <a:defRPr sz="1800" kern="1200">
-                <a:solidFill>
-                  <a:schemeClr val="tx1"/>
-                </a:solidFill>
-                <a:latin typeface="+mn-lt"/>
-                <a:ea typeface="+mn-ea"/>
-                <a:cs typeface="+mn-cs"/>
-              </a:defRPr>
-            </a:lvl6pPr>
-            <a:lvl7pPr marL="2971800" indent="-228600" algn="l" defTabSz="914400" rtl="0" eaLnBrk="1" latinLnBrk="0" hangingPunct="1">
-              <a:lnSpc>
-                <a:spcPct val="90000"/>
-              </a:lnSpc>
-              <a:spcBef>
-                <a:spcPts val="500"/>
-              </a:spcBef>
-              <a:buFont typeface="Arial" panose="020B0604020202020204" pitchFamily="34" charset="0"/>
-              <a:buChar char="•"/>
-              <a:defRPr sz="1800" kern="1200">
-                <a:solidFill>
-                  <a:schemeClr val="tx1"/>
-                </a:solidFill>
-                <a:latin typeface="+mn-lt"/>
-                <a:ea typeface="+mn-ea"/>
-                <a:cs typeface="+mn-cs"/>
-              </a:defRPr>
-            </a:lvl7pPr>
-            <a:lvl8pPr marL="3429000" indent="-228600" algn="l" defTabSz="914400" rtl="0" eaLnBrk="1" latinLnBrk="0" hangingPunct="1">
-              <a:lnSpc>
-                <a:spcPct val="90000"/>
-              </a:lnSpc>
-              <a:spcBef>
-                <a:spcPts val="500"/>
-              </a:spcBef>
-              <a:buFont typeface="Arial" panose="020B0604020202020204" pitchFamily="34" charset="0"/>
-              <a:buChar char="•"/>
-              <a:defRPr sz="1800" kern="1200">
-                <a:solidFill>
-                  <a:schemeClr val="tx1"/>
-                </a:solidFill>
-                <a:latin typeface="+mn-lt"/>
-                <a:ea typeface="+mn-ea"/>
-                <a:cs typeface="+mn-cs"/>
-              </a:defRPr>
-            </a:lvl8pPr>
-            <a:lvl9pPr marL="3886200" indent="-228600" algn="l" defTabSz="914400" rtl="0" eaLnBrk="1" latinLnBrk="0" hangingPunct="1">
-              <a:lnSpc>
-                <a:spcPct val="90000"/>
-              </a:lnSpc>
-              <a:spcBef>
-                <a:spcPts val="500"/>
-              </a:spcBef>
-              <a:buFont typeface="Arial" panose="020B0604020202020204" pitchFamily="34" charset="0"/>
-              <a:buChar char="•"/>
-              <a:defRPr sz="1800" kern="1200">
-                <a:solidFill>
-                  <a:schemeClr val="tx1"/>
-                </a:solidFill>
-                <a:latin typeface="+mn-lt"/>
-                <a:ea typeface="+mn-ea"/>
-                <a:cs typeface="+mn-cs"/>
-              </a:defRPr>
-            </a:lvl9pPr>
-          </a:lstStyle>
-          <a:p>
-            <a:pPr marL="0" indent="0">
-              <a:lnSpc>
                 <a:spcPct val="120000"/>
               </a:lnSpc>
               <a:buNone/>
@@ -6981,7 +6807,7 @@
 </p:sld>
 </file>
 
-<file path=ppt/slides/slide17.xml><?xml version="1.0" encoding="utf-8"?>
+<file path=ppt/slides/slide16.xml><?xml version="1.0" encoding="utf-8"?>
 <p:sld xmlns:a="http://schemas.openxmlformats.org/drawingml/2006/main" xmlns:r="http://schemas.openxmlformats.org/officeDocument/2006/relationships" xmlns:p="http://schemas.openxmlformats.org/presentationml/2006/main">
   <p:cSld>
     <p:spTree>
@@ -7277,6 +7103,185 @@
 </p:sld>
 </file>
 
+<file path=ppt/slides/slide17.xml><?xml version="1.0" encoding="utf-8"?>
+<p:sld xmlns:a="http://schemas.openxmlformats.org/drawingml/2006/main" xmlns:r="http://schemas.openxmlformats.org/officeDocument/2006/relationships" xmlns:p="http://schemas.openxmlformats.org/presentationml/2006/main">
+  <p:cSld>
+    <p:spTree>
+      <p:nvGrpSpPr>
+        <p:cNvPr id="1" name=""/>
+        <p:cNvGrpSpPr/>
+        <p:nvPr/>
+      </p:nvGrpSpPr>
+      <p:grpSpPr>
+        <a:xfrm>
+          <a:off x="0" y="0"/>
+          <a:ext cx="0" cy="0"/>
+          <a:chOff x="0" y="0"/>
+          <a:chExt cx="0" cy="0"/>
+        </a:xfrm>
+      </p:grpSpPr>
+      <p:sp>
+        <p:nvSpPr>
+          <p:cNvPr id="2" name="Title 1">
+            <a:extLst>
+              <a:ext uri="{FF2B5EF4-FFF2-40B4-BE49-F238E27FC236}">
+                <a16:creationId xmlns:a16="http://schemas.microsoft.com/office/drawing/2014/main" id="{C0622663-679C-370A-4B6D-51377AAE404F}"/>
+              </a:ext>
+            </a:extLst>
+          </p:cNvPr>
+          <p:cNvSpPr>
+            <a:spLocks noGrp="1"/>
+          </p:cNvSpPr>
+          <p:nvPr>
+            <p:ph type="title"/>
+          </p:nvPr>
+        </p:nvSpPr>
+        <p:spPr/>
+        <p:txBody>
+          <a:bodyPr vert="horz" lIns="91440" tIns="45720" rIns="91440" bIns="45720" rtlCol="0">
+            <a:normAutofit/>
+          </a:bodyPr>
+          <a:lstStyle/>
+          <a:p>
+            <a:pPr>
+              <a:lnSpc>
+                <a:spcPct val="130000"/>
+              </a:lnSpc>
+              <a:spcBef>
+                <a:spcPts val="1000"/>
+              </a:spcBef>
+              <a:buFont typeface="Arial" panose="020B0604020202020204" pitchFamily="34" charset="0"/>
+            </a:pPr>
+            <a:r>
+              <a:rPr lang="en-CH" sz="3600" b="1" dirty="0">
+                <a:latin typeface="Book Antiqua" panose="02040602050305030304" pitchFamily="18" charset="0"/>
+                <a:ea typeface="+mn-ea"/>
+                <a:cs typeface="+mn-cs"/>
+              </a:rPr>
+              <a:t>Adaptive AI – 3) Joint Task Completion</a:t>
+            </a:r>
+          </a:p>
+        </p:txBody>
+      </p:sp>
+      <p:sp>
+        <p:nvSpPr>
+          <p:cNvPr id="3" name="Content Placeholder 2">
+            <a:extLst>
+              <a:ext uri="{FF2B5EF4-FFF2-40B4-BE49-F238E27FC236}">
+                <a16:creationId xmlns:a16="http://schemas.microsoft.com/office/drawing/2014/main" id="{D16006F8-C647-AF45-AEE7-0D7868ACAAE9}"/>
+              </a:ext>
+            </a:extLst>
+          </p:cNvPr>
+          <p:cNvSpPr>
+            <a:spLocks noGrp="1"/>
+          </p:cNvSpPr>
+          <p:nvPr>
+            <p:ph idx="1"/>
+          </p:nvPr>
+        </p:nvSpPr>
+        <p:spPr>
+          <a:xfrm>
+            <a:off x="838200" y="1825625"/>
+            <a:ext cx="10515600" cy="4351338"/>
+          </a:xfrm>
+        </p:spPr>
+        <p:txBody>
+          <a:bodyPr>
+            <a:normAutofit/>
+          </a:bodyPr>
+          <a:lstStyle/>
+          <a:p>
+            <a:pPr marL="0" indent="0">
+              <a:lnSpc>
+                <a:spcPct val="120000"/>
+              </a:lnSpc>
+              <a:buNone/>
+            </a:pPr>
+            <a:r>
+              <a:rPr lang="en-GB" sz="2400" dirty="0">
+                <a:latin typeface="Suisse Int'l" panose="020B0804000000000000" pitchFamily="34" charset="77"/>
+              </a:rPr>
+              <a:t>AI agents need to adapt as part of human-AI teams (Zhao et al., 2022):</a:t>
+            </a:r>
+          </a:p>
+          <a:p>
+            <a:pPr>
+              <a:lnSpc>
+                <a:spcPct val="120000"/>
+              </a:lnSpc>
+            </a:pPr>
+            <a:r>
+              <a:rPr lang="en-GB" sz="2400" dirty="0">
+                <a:latin typeface="Suisse Int'l" panose="020B0804000000000000" pitchFamily="34" charset="77"/>
+              </a:rPr>
+              <a:t>to goals and intentions of the human teammates;</a:t>
+            </a:r>
+          </a:p>
+          <a:p>
+            <a:pPr>
+              <a:lnSpc>
+                <a:spcPct val="120000"/>
+              </a:lnSpc>
+            </a:pPr>
+            <a:r>
+              <a:rPr lang="en-GB" sz="2400" dirty="0">
+                <a:latin typeface="Suisse Int'l" panose="020B0804000000000000" pitchFamily="34" charset="77"/>
+              </a:rPr>
+              <a:t>to cognitive features of the human;</a:t>
+            </a:r>
+          </a:p>
+          <a:p>
+            <a:pPr>
+              <a:lnSpc>
+                <a:spcPct val="120000"/>
+              </a:lnSpc>
+            </a:pPr>
+            <a:r>
+              <a:rPr lang="en-GB" sz="2400" dirty="0">
+                <a:latin typeface="Suisse Int'l" panose="020B0804000000000000" pitchFamily="34" charset="77"/>
+              </a:rPr>
+              <a:t>to physical factors of the human in robot-human interactions</a:t>
+            </a:r>
+            <a:br>
+              <a:rPr lang="en-GB" sz="2400" dirty="0">
+                <a:latin typeface="Suisse Int'l" panose="020B0804000000000000" pitchFamily="34" charset="77"/>
+              </a:rPr>
+            </a:br>
+            <a:r>
+              <a:rPr lang="en-GB" sz="2400" dirty="0">
+                <a:latin typeface="Suisse Int'l" panose="020B0804000000000000" pitchFamily="34" charset="77"/>
+              </a:rPr>
+              <a:t>(e.g., fatigue of the human); and</a:t>
+            </a:r>
+          </a:p>
+          <a:p>
+            <a:pPr>
+              <a:lnSpc>
+                <a:spcPct val="120000"/>
+              </a:lnSpc>
+            </a:pPr>
+            <a:r>
+              <a:rPr lang="en-GB" sz="2400" dirty="0">
+                <a:latin typeface="Suisse Int'l" panose="020B0804000000000000" pitchFamily="34" charset="77"/>
+              </a:rPr>
+              <a:t>adaptation of learned human models to transfer a learned model to interaction with another human.</a:t>
+            </a:r>
+          </a:p>
+        </p:txBody>
+      </p:sp>
+    </p:spTree>
+    <p:extLst>
+      <p:ext uri="{BB962C8B-B14F-4D97-AF65-F5344CB8AC3E}">
+        <p14:creationId xmlns:p14="http://schemas.microsoft.com/office/powerpoint/2010/main" val="1208052413"/>
+      </p:ext>
+    </p:extLst>
+  </p:cSld>
+  <p:clrMapOvr>
+    <a:masterClrMapping/>
+  </p:clrMapOvr>
+</p:sld>
+</file>
+
 <file path=ppt/slides/slide18.xml><?xml version="1.0" encoding="utf-8"?>
 <p:sld xmlns:a="http://schemas.openxmlformats.org/drawingml/2006/main" xmlns:r="http://schemas.openxmlformats.org/officeDocument/2006/relationships" xmlns:p="http://schemas.openxmlformats.org/presentationml/2006/main">
   <p:cSld>
@@ -7332,7 +7337,7 @@
                 <a:ea typeface="+mn-ea"/>
                 <a:cs typeface="+mn-cs"/>
               </a:rPr>
-              <a:t>Adaptive AI – 3) Joint Task Completion</a:t>
+              <a:t>Adaptive AI – 4) Others Agents </a:t>
             </a:r>
           </a:p>
         </p:txBody>
@@ -7361,7 +7366,7 @@
         </p:spPr>
         <p:txBody>
           <a:bodyPr>
-            <a:normAutofit/>
+            <a:normAutofit fontScale="92500"/>
           </a:bodyPr>
           <a:lstStyle/>
           <a:p>
@@ -7375,7 +7380,7 @@
               <a:rPr lang="en-GB" sz="2400" dirty="0">
                 <a:latin typeface="Suisse Int'l" panose="020B0804000000000000" pitchFamily="34" charset="77"/>
               </a:rPr>
-              <a:t>AI agents need to adapt as part of human-AI teams (Zhao et al., 2022):</a:t>
+              <a:t>AI may adapt to other agents:</a:t>
             </a:r>
           </a:p>
           <a:p>
@@ -7388,7 +7393,7 @@
               <a:rPr lang="en-GB" sz="2400" dirty="0">
                 <a:latin typeface="Suisse Int'l" panose="020B0804000000000000" pitchFamily="34" charset="77"/>
               </a:rPr>
-              <a:t>to goals and intentions of the human teammates;</a:t>
+              <a:t>changing team composition (new human members, other AI agents)</a:t>
             </a:r>
           </a:p>
           <a:p>
@@ -7401,7 +7406,32 @@
               <a:rPr lang="en-GB" sz="2400" dirty="0">
                 <a:latin typeface="Suisse Int'l" panose="020B0804000000000000" pitchFamily="34" charset="77"/>
               </a:rPr>
-              <a:t>to cognitive features of the human;</a:t>
+              <a:t>AI should account for effects of its own actions on other agents</a:t>
+            </a:r>
+          </a:p>
+          <a:p>
+            <a:pPr marL="0" indent="0">
+              <a:lnSpc>
+                <a:spcPct val="120000"/>
+              </a:lnSpc>
+              <a:buNone/>
+            </a:pPr>
+            <a:endParaRPr lang="en-GB" sz="2400" dirty="0">
+              <a:latin typeface="Suisse Int'l" panose="020B0804000000000000" pitchFamily="34" charset="77"/>
+            </a:endParaRPr>
+          </a:p>
+          <a:p>
+            <a:pPr marL="0" indent="0">
+              <a:lnSpc>
+                <a:spcPct val="120000"/>
+              </a:lnSpc>
+              <a:buNone/>
+            </a:pPr>
+            <a:r>
+              <a:rPr lang="en-GB" sz="2400" dirty="0">
+                <a:latin typeface="Suisse Int'l" panose="020B0804000000000000" pitchFamily="34" charset="77"/>
+              </a:rPr>
+              <a:t>Multiagent reinforcement learning (MARL):</a:t>
             </a:r>
           </a:p>
           <a:p>
@@ -7414,18 +7444,38 @@
               <a:rPr lang="en-GB" sz="2400" dirty="0">
                 <a:latin typeface="Suisse Int'l" panose="020B0804000000000000" pitchFamily="34" charset="77"/>
               </a:rPr>
-              <a:t>to physical factors of the human in robot-human interactions</a:t>
-            </a:r>
-            <a:br>
+              <a:t>AI agent is trained based on the effect of its actions on the environment while consider potential (re)actions of the other agents (</a:t>
+            </a:r>
+            <a:r>
+              <a:rPr lang="en-GB" sz="2400" dirty="0" err="1">
+                <a:latin typeface="Suisse Int'l" panose="020B0804000000000000" pitchFamily="34" charset="77"/>
+              </a:rPr>
+              <a:t>Canese</a:t>
+            </a:r>
+            <a:r>
               <a:rPr lang="en-GB" sz="2400" dirty="0">
                 <a:latin typeface="Suisse Int'l" panose="020B0804000000000000" pitchFamily="34" charset="77"/>
               </a:rPr>
-            </a:br>
+              <a:t> et al., 2021).</a:t>
+            </a:r>
+          </a:p>
+          <a:p>
+            <a:pPr>
+              <a:lnSpc>
+                <a:spcPct val="120000"/>
+              </a:lnSpc>
+            </a:pPr>
+            <a:r>
+              <a:rPr lang="en-GB" sz="2400" dirty="0" err="1">
+                <a:latin typeface="Suisse Int'l" panose="020B0804000000000000" pitchFamily="34" charset="77"/>
+              </a:rPr>
+              <a:t>MARLtrained</a:t>
+            </a:r>
             <a:r>
               <a:rPr lang="en-GB" sz="2400" dirty="0">
                 <a:latin typeface="Suisse Int'l" panose="020B0804000000000000" pitchFamily="34" charset="77"/>
               </a:rPr>
-              <a:t>(e.g., fatigue of the human); and</a:t>
+              <a:t> AI agent show high adaptability to other agents.</a:t>
             </a:r>
           </a:p>
           <a:p>
@@ -7434,19 +7484,16 @@
                 <a:spcPct val="120000"/>
               </a:lnSpc>
             </a:pPr>
-            <a:r>
-              <a:rPr lang="en-GB" sz="2400" dirty="0">
-                <a:latin typeface="Suisse Int'l" panose="020B0804000000000000" pitchFamily="34" charset="77"/>
-              </a:rPr>
-              <a:t>adaptation of learned human models to transfer a learned model to interaction with another human.</a:t>
-            </a:r>
+            <a:endParaRPr lang="en-GB" sz="2400" dirty="0">
+              <a:latin typeface="Suisse Int'l" panose="020B0804000000000000" pitchFamily="34" charset="77"/>
+            </a:endParaRPr>
           </a:p>
         </p:txBody>
       </p:sp>
     </p:spTree>
     <p:extLst>
       <p:ext uri="{BB962C8B-B14F-4D97-AF65-F5344CB8AC3E}">
-        <p14:creationId xmlns:p14="http://schemas.microsoft.com/office/powerpoint/2010/main" val="1208052413"/>
+        <p14:creationId xmlns:p14="http://schemas.microsoft.com/office/powerpoint/2010/main" val="1665806645"/>
       </p:ext>
     </p:extLst>
   </p:cSld>
@@ -7511,7 +7558,7 @@
                 <a:ea typeface="+mn-ea"/>
                 <a:cs typeface="+mn-cs"/>
               </a:rPr>
-              <a:t>Adaptive AI – 4) Others Agents </a:t>
+              <a:t>Adaptive AI – 5) Changing Environment</a:t>
             </a:r>
           </a:p>
         </p:txBody>
@@ -7540,7 +7587,7 @@
         </p:spPr>
         <p:txBody>
           <a:bodyPr>
-            <a:normAutofit fontScale="92500"/>
+            <a:normAutofit/>
           </a:bodyPr>
           <a:lstStyle/>
           <a:p>
@@ -7551,10 +7598,10 @@
               <a:buNone/>
             </a:pPr>
             <a:r>
-              <a:rPr lang="en-GB" sz="2400" dirty="0">
-                <a:latin typeface="Suisse Int'l" panose="020B0804000000000000" pitchFamily="34" charset="77"/>
-              </a:rPr>
-              <a:t>AI may adapt to other agents:</a:t>
+              <a:rPr lang="en-GB" sz="2200" dirty="0">
+                <a:latin typeface="Suisse Int'l" panose="020B0804000000000000" pitchFamily="34" charset="77"/>
+              </a:rPr>
+              <a:t>Societal trends, political or legal changes, etc.</a:t>
             </a:r>
           </a:p>
           <a:p>
@@ -7564,10 +7611,16 @@
               </a:lnSpc>
             </a:pPr>
             <a:r>
-              <a:rPr lang="en-GB" sz="2400" dirty="0">
-                <a:latin typeface="Suisse Int'l" panose="020B0804000000000000" pitchFamily="34" charset="77"/>
-              </a:rPr>
-              <a:t>changing team composition (new human members, other AI agents)</a:t>
+              <a:rPr lang="en-GB" sz="2200" b="1" dirty="0">
+                <a:latin typeface="Suisse Int'l Semi Bold" panose="020B0804000000000000" pitchFamily="34" charset="77"/>
+              </a:rPr>
+              <a:t>concept drift</a:t>
+            </a:r>
+            <a:r>
+              <a:rPr lang="en-GB" sz="2200" dirty="0">
+                <a:latin typeface="Suisse Int'l" panose="020B0804000000000000" pitchFamily="34" charset="77"/>
+              </a:rPr>
+              <a:t>: changes to objectives that AI models were designed for</a:t>
             </a:r>
           </a:p>
           <a:p>
@@ -7577,10 +7630,16 @@
               </a:lnSpc>
             </a:pPr>
             <a:r>
-              <a:rPr lang="en-GB" sz="2400" dirty="0">
-                <a:latin typeface="Suisse Int'l" panose="020B0804000000000000" pitchFamily="34" charset="77"/>
-              </a:rPr>
-              <a:t>AI should account for effects of its own actions on other agents</a:t>
+              <a:rPr lang="en-GB" sz="2200" b="1" dirty="0">
+                <a:latin typeface="Suisse Int'l Semi Bold" panose="020B0804000000000000" pitchFamily="34" charset="77"/>
+              </a:rPr>
+              <a:t>data drift</a:t>
+            </a:r>
+            <a:r>
+              <a:rPr lang="en-GB" sz="2200" dirty="0">
+                <a:latin typeface="Suisse Int'l" panose="020B0804000000000000" pitchFamily="34" charset="77"/>
+              </a:rPr>
+              <a:t>: changes in the data distribution (Lu et al., 2020)</a:t>
             </a:r>
           </a:p>
           <a:p>
@@ -7590,7 +7649,7 @@
               </a:lnSpc>
               <a:buNone/>
             </a:pPr>
-            <a:endParaRPr lang="en-GB" sz="2400" dirty="0">
+            <a:endParaRPr lang="en-GB" sz="2200" dirty="0">
               <a:latin typeface="Suisse Int'l" panose="020B0804000000000000" pitchFamily="34" charset="77"/>
             </a:endParaRPr>
           </a:p>
@@ -7602,10 +7661,11 @@
               <a:buNone/>
             </a:pPr>
             <a:r>
-              <a:rPr lang="en-GB" sz="2400" dirty="0">
-                <a:latin typeface="Suisse Int'l" panose="020B0804000000000000" pitchFamily="34" charset="77"/>
-              </a:rPr>
-              <a:t>Multiagent reinforcement learning (MARL):</a:t>
+              <a:rPr lang="en-GB" sz="2200" dirty="0">
+                <a:latin typeface="Suisse Int'l" panose="020B0804000000000000" pitchFamily="34" charset="77"/>
+                <a:sym typeface="Wingdings" pitchFamily="2" charset="2"/>
+              </a:rPr>
+              <a:t>Requires re-training of AI model to adapt:</a:t>
             </a:r>
           </a:p>
           <a:p>
@@ -7615,22 +7675,11 @@
               </a:lnSpc>
             </a:pPr>
             <a:r>
-              <a:rPr lang="en-GB" sz="2400" dirty="0">
-                <a:latin typeface="Suisse Int'l" panose="020B0804000000000000" pitchFamily="34" charset="77"/>
-              </a:rPr>
-              <a:t>AI agent is trained based on the effect of its actions on the environment while consider potential (re)actions of the other agents (</a:t>
-            </a:r>
-            <a:r>
-              <a:rPr lang="en-GB" sz="2400" dirty="0" err="1">
-                <a:latin typeface="Suisse Int'l" panose="020B0804000000000000" pitchFamily="34" charset="77"/>
-              </a:rPr>
-              <a:t>Canese</a:t>
-            </a:r>
-            <a:r>
-              <a:rPr lang="en-GB" sz="2400" dirty="0">
-                <a:latin typeface="Suisse Int'l" panose="020B0804000000000000" pitchFamily="34" charset="77"/>
-              </a:rPr>
-              <a:t> et al., 2021).</a:t>
+              <a:rPr lang="en-GB" sz="2200" dirty="0">
+                <a:latin typeface="Suisse Int'l" panose="020B0804000000000000" pitchFamily="34" charset="77"/>
+                <a:sym typeface="Wingdings" pitchFamily="2" charset="2"/>
+              </a:rPr>
+              <a:t>Online training: continuous training and redeploy of AI model</a:t>
             </a:r>
           </a:p>
           <a:p>
@@ -7640,25 +7689,20 @@
               </a:lnSpc>
             </a:pPr>
             <a:r>
-              <a:rPr lang="en-GB" sz="2400" dirty="0" err="1">
-                <a:latin typeface="Suisse Int'l" panose="020B0804000000000000" pitchFamily="34" charset="77"/>
-              </a:rPr>
-              <a:t>MARLtrained</a:t>
-            </a:r>
-            <a:r>
-              <a:rPr lang="en-GB" sz="2400" dirty="0">
-                <a:latin typeface="Suisse Int'l" panose="020B0804000000000000" pitchFamily="34" charset="77"/>
-              </a:rPr>
-              <a:t> AI agent show high adaptability to other agents.</a:t>
-            </a:r>
-          </a:p>
-          <a:p>
-            <a:pPr>
-              <a:lnSpc>
-                <a:spcPct val="120000"/>
-              </a:lnSpc>
-            </a:pPr>
-            <a:endParaRPr lang="en-GB" sz="2400" dirty="0">
+              <a:rPr lang="en-GB" sz="2200" b="1" dirty="0">
+                <a:latin typeface="Suisse Int'l Semi Bold" panose="020B0804000000000000" pitchFamily="34" charset="77"/>
+                <a:sym typeface="Wingdings" pitchFamily="2" charset="2"/>
+              </a:rPr>
+              <a:t>Model drift</a:t>
+            </a:r>
+            <a:r>
+              <a:rPr lang="en-GB" sz="2200" dirty="0">
+                <a:latin typeface="Suisse Int'l" panose="020B0804000000000000" pitchFamily="34" charset="77"/>
+                <a:sym typeface="Wingdings" pitchFamily="2" charset="2"/>
+              </a:rPr>
+              <a:t>: performance of continuously retrained model degrades over time</a:t>
+            </a:r>
+            <a:endParaRPr lang="en-GB" sz="2200" dirty="0">
               <a:latin typeface="Suisse Int'l" panose="020B0804000000000000" pitchFamily="34" charset="77"/>
             </a:endParaRPr>
           </a:p>
@@ -7667,7 +7711,7 @@
     </p:spTree>
     <p:extLst>
       <p:ext uri="{BB962C8B-B14F-4D97-AF65-F5344CB8AC3E}">
-        <p14:creationId xmlns:p14="http://schemas.microsoft.com/office/powerpoint/2010/main" val="1665806645"/>
+        <p14:creationId xmlns:p14="http://schemas.microsoft.com/office/powerpoint/2010/main" val="4156994933"/>
       </p:ext>
     </p:extLst>
   </p:cSld>
@@ -7909,224 +7953,6 @@
 <file path=ppt/slides/slide20.xml><?xml version="1.0" encoding="utf-8"?>
 <p:sld xmlns:a="http://schemas.openxmlformats.org/drawingml/2006/main" xmlns:r="http://schemas.openxmlformats.org/officeDocument/2006/relationships" xmlns:p="http://schemas.openxmlformats.org/presentationml/2006/main">
   <p:cSld>
-    <p:spTree>
-      <p:nvGrpSpPr>
-        <p:cNvPr id="1" name=""/>
-        <p:cNvGrpSpPr/>
-        <p:nvPr/>
-      </p:nvGrpSpPr>
-      <p:grpSpPr>
-        <a:xfrm>
-          <a:off x="0" y="0"/>
-          <a:ext cx="0" cy="0"/>
-          <a:chOff x="0" y="0"/>
-          <a:chExt cx="0" cy="0"/>
-        </a:xfrm>
-      </p:grpSpPr>
-      <p:sp>
-        <p:nvSpPr>
-          <p:cNvPr id="2" name="Title 1">
-            <a:extLst>
-              <a:ext uri="{FF2B5EF4-FFF2-40B4-BE49-F238E27FC236}">
-                <a16:creationId xmlns:a16="http://schemas.microsoft.com/office/drawing/2014/main" id="{C0622663-679C-370A-4B6D-51377AAE404F}"/>
-              </a:ext>
-            </a:extLst>
-          </p:cNvPr>
-          <p:cNvSpPr>
-            <a:spLocks noGrp="1"/>
-          </p:cNvSpPr>
-          <p:nvPr>
-            <p:ph type="title"/>
-          </p:nvPr>
-        </p:nvSpPr>
-        <p:spPr/>
-        <p:txBody>
-          <a:bodyPr vert="horz" lIns="91440" tIns="45720" rIns="91440" bIns="45720" rtlCol="0">
-            <a:normAutofit/>
-          </a:bodyPr>
-          <a:lstStyle/>
-          <a:p>
-            <a:pPr>
-              <a:lnSpc>
-                <a:spcPct val="130000"/>
-              </a:lnSpc>
-              <a:spcBef>
-                <a:spcPts val="1000"/>
-              </a:spcBef>
-              <a:buFont typeface="Arial" panose="020B0604020202020204" pitchFamily="34" charset="0"/>
-            </a:pPr>
-            <a:r>
-              <a:rPr lang="en-CH" sz="3600" b="1" dirty="0">
-                <a:latin typeface="Book Antiqua" panose="02040602050305030304" pitchFamily="18" charset="0"/>
-                <a:ea typeface="+mn-ea"/>
-                <a:cs typeface="+mn-cs"/>
-              </a:rPr>
-              <a:t>Adaptive AI – 5) Changing Environment</a:t>
-            </a:r>
-          </a:p>
-        </p:txBody>
-      </p:sp>
-      <p:sp>
-        <p:nvSpPr>
-          <p:cNvPr id="3" name="Content Placeholder 2">
-            <a:extLst>
-              <a:ext uri="{FF2B5EF4-FFF2-40B4-BE49-F238E27FC236}">
-                <a16:creationId xmlns:a16="http://schemas.microsoft.com/office/drawing/2014/main" id="{D16006F8-C647-AF45-AEE7-0D7868ACAAE9}"/>
-              </a:ext>
-            </a:extLst>
-          </p:cNvPr>
-          <p:cNvSpPr>
-            <a:spLocks noGrp="1"/>
-          </p:cNvSpPr>
-          <p:nvPr>
-            <p:ph idx="1"/>
-          </p:nvPr>
-        </p:nvSpPr>
-        <p:spPr>
-          <a:xfrm>
-            <a:off x="838200" y="1825625"/>
-            <a:ext cx="10515600" cy="4351338"/>
-          </a:xfrm>
-        </p:spPr>
-        <p:txBody>
-          <a:bodyPr>
-            <a:normAutofit/>
-          </a:bodyPr>
-          <a:lstStyle/>
-          <a:p>
-            <a:pPr marL="0" indent="0">
-              <a:lnSpc>
-                <a:spcPct val="120000"/>
-              </a:lnSpc>
-              <a:buNone/>
-            </a:pPr>
-            <a:r>
-              <a:rPr lang="en-GB" sz="2200" dirty="0">
-                <a:latin typeface="Suisse Int'l" panose="020B0804000000000000" pitchFamily="34" charset="77"/>
-              </a:rPr>
-              <a:t>Societal trends, political or legal changes, etc.</a:t>
-            </a:r>
-          </a:p>
-          <a:p>
-            <a:pPr>
-              <a:lnSpc>
-                <a:spcPct val="120000"/>
-              </a:lnSpc>
-            </a:pPr>
-            <a:r>
-              <a:rPr lang="en-GB" sz="2200" b="1" dirty="0">
-                <a:latin typeface="Suisse Int'l Semi Bold" panose="020B0804000000000000" pitchFamily="34" charset="77"/>
-              </a:rPr>
-              <a:t>concept drift</a:t>
-            </a:r>
-            <a:r>
-              <a:rPr lang="en-GB" sz="2200" dirty="0">
-                <a:latin typeface="Suisse Int'l" panose="020B0804000000000000" pitchFamily="34" charset="77"/>
-              </a:rPr>
-              <a:t>: changes to objectives that AI models were designed for</a:t>
-            </a:r>
-          </a:p>
-          <a:p>
-            <a:pPr>
-              <a:lnSpc>
-                <a:spcPct val="120000"/>
-              </a:lnSpc>
-            </a:pPr>
-            <a:r>
-              <a:rPr lang="en-GB" sz="2200" b="1" dirty="0">
-                <a:latin typeface="Suisse Int'l Semi Bold" panose="020B0804000000000000" pitchFamily="34" charset="77"/>
-              </a:rPr>
-              <a:t>data drift</a:t>
-            </a:r>
-            <a:r>
-              <a:rPr lang="en-GB" sz="2200" dirty="0">
-                <a:latin typeface="Suisse Int'l" panose="020B0804000000000000" pitchFamily="34" charset="77"/>
-              </a:rPr>
-              <a:t>: changes in the data distribution (Lu et al., 2020)</a:t>
-            </a:r>
-          </a:p>
-          <a:p>
-            <a:pPr marL="0" indent="0">
-              <a:lnSpc>
-                <a:spcPct val="120000"/>
-              </a:lnSpc>
-              <a:buNone/>
-            </a:pPr>
-            <a:endParaRPr lang="en-GB" sz="2200" dirty="0">
-              <a:latin typeface="Suisse Int'l" panose="020B0804000000000000" pitchFamily="34" charset="77"/>
-            </a:endParaRPr>
-          </a:p>
-          <a:p>
-            <a:pPr marL="0" indent="0">
-              <a:lnSpc>
-                <a:spcPct val="120000"/>
-              </a:lnSpc>
-              <a:buNone/>
-            </a:pPr>
-            <a:r>
-              <a:rPr lang="en-GB" sz="2200" dirty="0">
-                <a:latin typeface="Suisse Int'l" panose="020B0804000000000000" pitchFamily="34" charset="77"/>
-                <a:sym typeface="Wingdings" pitchFamily="2" charset="2"/>
-              </a:rPr>
-              <a:t>Requires re-training of AI model to adapt:</a:t>
-            </a:r>
-          </a:p>
-          <a:p>
-            <a:pPr>
-              <a:lnSpc>
-                <a:spcPct val="120000"/>
-              </a:lnSpc>
-            </a:pPr>
-            <a:r>
-              <a:rPr lang="en-GB" sz="2200" dirty="0">
-                <a:latin typeface="Suisse Int'l" panose="020B0804000000000000" pitchFamily="34" charset="77"/>
-                <a:sym typeface="Wingdings" pitchFamily="2" charset="2"/>
-              </a:rPr>
-              <a:t>Online training: continuous training and redeploy of AI model</a:t>
-            </a:r>
-          </a:p>
-          <a:p>
-            <a:pPr>
-              <a:lnSpc>
-                <a:spcPct val="120000"/>
-              </a:lnSpc>
-            </a:pPr>
-            <a:r>
-              <a:rPr lang="en-GB" sz="2200" b="1" dirty="0">
-                <a:latin typeface="Suisse Int'l Semi Bold" panose="020B0804000000000000" pitchFamily="34" charset="77"/>
-                <a:sym typeface="Wingdings" pitchFamily="2" charset="2"/>
-              </a:rPr>
-              <a:t>Model drift</a:t>
-            </a:r>
-            <a:r>
-              <a:rPr lang="en-GB" sz="2200" dirty="0">
-                <a:latin typeface="Suisse Int'l" panose="020B0804000000000000" pitchFamily="34" charset="77"/>
-                <a:sym typeface="Wingdings" pitchFamily="2" charset="2"/>
-              </a:rPr>
-              <a:t>: performance of continuously retrained model degrades over time</a:t>
-            </a:r>
-            <a:endParaRPr lang="en-GB" sz="2200" dirty="0">
-              <a:latin typeface="Suisse Int'l" panose="020B0804000000000000" pitchFamily="34" charset="77"/>
-            </a:endParaRPr>
-          </a:p>
-        </p:txBody>
-      </p:sp>
-    </p:spTree>
-    <p:extLst>
-      <p:ext uri="{BB962C8B-B14F-4D97-AF65-F5344CB8AC3E}">
-        <p14:creationId xmlns:p14="http://schemas.microsoft.com/office/powerpoint/2010/main" val="4156994933"/>
-      </p:ext>
-    </p:extLst>
-  </p:cSld>
-  <p:clrMapOvr>
-    <a:masterClrMapping/>
-  </p:clrMapOvr>
-</p:sld>
-</file>
-
-<file path=ppt/slides/slide21.xml><?xml version="1.0" encoding="utf-8"?>
-<p:sld xmlns:a="http://schemas.openxmlformats.org/drawingml/2006/main" xmlns:r="http://schemas.openxmlformats.org/officeDocument/2006/relationships" xmlns:p="http://schemas.openxmlformats.org/presentationml/2006/main">
-  <p:cSld>
     <p:bg>
       <p:bgPr>
         <a:solidFill>
@@ -8288,6 +8114,231 @@
 </p:sld>
 </file>
 
+<file path=ppt/slides/slide21.xml><?xml version="1.0" encoding="utf-8"?>
+<p:sld xmlns:a="http://schemas.openxmlformats.org/drawingml/2006/main" xmlns:r="http://schemas.openxmlformats.org/officeDocument/2006/relationships" xmlns:p="http://schemas.openxmlformats.org/presentationml/2006/main">
+  <p:cSld>
+    <p:spTree>
+      <p:nvGrpSpPr>
+        <p:cNvPr id="1" name=""/>
+        <p:cNvGrpSpPr/>
+        <p:nvPr/>
+      </p:nvGrpSpPr>
+      <p:grpSpPr>
+        <a:xfrm>
+          <a:off x="0" y="0"/>
+          <a:ext cx="0" cy="0"/>
+          <a:chOff x="0" y="0"/>
+          <a:chExt cx="0" cy="0"/>
+        </a:xfrm>
+      </p:grpSpPr>
+      <p:sp>
+        <p:nvSpPr>
+          <p:cNvPr id="2" name="Title 1">
+            <a:extLst>
+              <a:ext uri="{FF2B5EF4-FFF2-40B4-BE49-F238E27FC236}">
+                <a16:creationId xmlns:a16="http://schemas.microsoft.com/office/drawing/2014/main" id="{C0622663-679C-370A-4B6D-51377AAE404F}"/>
+              </a:ext>
+            </a:extLst>
+          </p:cNvPr>
+          <p:cNvSpPr>
+            <a:spLocks noGrp="1"/>
+          </p:cNvSpPr>
+          <p:nvPr>
+            <p:ph type="title"/>
+          </p:nvPr>
+        </p:nvSpPr>
+        <p:spPr/>
+        <p:txBody>
+          <a:bodyPr vert="horz" lIns="91440" tIns="45720" rIns="91440" bIns="45720" rtlCol="0">
+            <a:normAutofit/>
+          </a:bodyPr>
+          <a:lstStyle/>
+          <a:p>
+            <a:pPr>
+              <a:lnSpc>
+                <a:spcPct val="130000"/>
+              </a:lnSpc>
+              <a:spcBef>
+                <a:spcPts val="1000"/>
+              </a:spcBef>
+              <a:buFont typeface="Arial" panose="020B0604020202020204" pitchFamily="34" charset="0"/>
+            </a:pPr>
+            <a:r>
+              <a:rPr lang="en-CH" sz="3600" b="1" dirty="0">
+                <a:latin typeface="Book Antiqua" panose="02040602050305030304" pitchFamily="18" charset="0"/>
+                <a:ea typeface="+mn-ea"/>
+                <a:cs typeface="+mn-cs"/>
+              </a:rPr>
+              <a:t>Competitive Advantage of AI</a:t>
+            </a:r>
+          </a:p>
+        </p:txBody>
+      </p:sp>
+      <p:sp>
+        <p:nvSpPr>
+          <p:cNvPr id="3" name="Content Placeholder 2">
+            <a:extLst>
+              <a:ext uri="{FF2B5EF4-FFF2-40B4-BE49-F238E27FC236}">
+                <a16:creationId xmlns:a16="http://schemas.microsoft.com/office/drawing/2014/main" id="{D16006F8-C647-AF45-AEE7-0D7868ACAAE9}"/>
+              </a:ext>
+            </a:extLst>
+          </p:cNvPr>
+          <p:cNvSpPr>
+            <a:spLocks noGrp="1"/>
+          </p:cNvSpPr>
+          <p:nvPr>
+            <p:ph idx="1"/>
+          </p:nvPr>
+        </p:nvSpPr>
+        <p:spPr>
+          <a:xfrm>
+            <a:off x="838200" y="1825625"/>
+            <a:ext cx="10515600" cy="4351338"/>
+          </a:xfrm>
+        </p:spPr>
+        <p:txBody>
+          <a:bodyPr>
+            <a:normAutofit/>
+          </a:bodyPr>
+          <a:lstStyle/>
+          <a:p>
+            <a:pPr>
+              <a:lnSpc>
+                <a:spcPct val="120000"/>
+              </a:lnSpc>
+            </a:pPr>
+            <a:r>
+              <a:rPr lang="en-GB" sz="2000" dirty="0">
+                <a:latin typeface="Suisse Int'l" panose="020B0804000000000000" pitchFamily="34" charset="77"/>
+              </a:rPr>
+              <a:t>Davenport (2018):</a:t>
+            </a:r>
+          </a:p>
+          <a:p>
+            <a:pPr lvl="1">
+              <a:lnSpc>
+                <a:spcPct val="120000"/>
+              </a:lnSpc>
+            </a:pPr>
+            <a:r>
+              <a:rPr lang="en-GB" sz="2000" dirty="0">
+                <a:latin typeface="Suisse Int'l" panose="020B0804000000000000" pitchFamily="34" charset="77"/>
+              </a:rPr>
+              <a:t>AI primarily used by large enterprises, technology companies, AI start-ups</a:t>
+            </a:r>
+          </a:p>
+          <a:p>
+            <a:pPr lvl="1">
+              <a:lnSpc>
+                <a:spcPct val="120000"/>
+              </a:lnSpc>
+            </a:pPr>
+            <a:r>
+              <a:rPr lang="en-GB" sz="2000" dirty="0">
+                <a:latin typeface="Suisse Int'l" panose="020B0804000000000000" pitchFamily="34" charset="77"/>
+              </a:rPr>
+              <a:t>AI capabilities:</a:t>
+            </a:r>
+          </a:p>
+          <a:p>
+            <a:pPr lvl="2">
+              <a:lnSpc>
+                <a:spcPct val="120000"/>
+              </a:lnSpc>
+            </a:pPr>
+            <a:r>
+              <a:rPr lang="en-GB" dirty="0">
+                <a:latin typeface="Suisse Int'l" panose="020B0804000000000000" pitchFamily="34" charset="77"/>
+              </a:rPr>
+              <a:t>robotics and robotic process automation (RPA)</a:t>
+            </a:r>
+          </a:p>
+          <a:p>
+            <a:pPr lvl="2">
+              <a:lnSpc>
+                <a:spcPct val="120000"/>
+              </a:lnSpc>
+            </a:pPr>
+            <a:r>
+              <a:rPr lang="en-GB" dirty="0">
+                <a:latin typeface="Suisse Int'l" panose="020B0804000000000000" pitchFamily="34" charset="77"/>
+              </a:rPr>
+              <a:t>gaining insights from data through machine learning</a:t>
+            </a:r>
+          </a:p>
+          <a:p>
+            <a:pPr lvl="2">
+              <a:lnSpc>
+                <a:spcPct val="120000"/>
+              </a:lnSpc>
+            </a:pPr>
+            <a:r>
+              <a:rPr lang="en-GB" dirty="0">
+                <a:latin typeface="Suisse Int'l" panose="020B0804000000000000" pitchFamily="34" charset="77"/>
+              </a:rPr>
+              <a:t>AI-based engagement with employees, customers through chatbots or intelligent agents</a:t>
+            </a:r>
+          </a:p>
+          <a:p>
+            <a:pPr>
+              <a:lnSpc>
+                <a:spcPct val="120000"/>
+              </a:lnSpc>
+            </a:pPr>
+            <a:r>
+              <a:rPr lang="en-GB" sz="2000" dirty="0">
+                <a:latin typeface="Suisse Int'l" panose="020B0804000000000000" pitchFamily="34" charset="77"/>
+              </a:rPr>
+              <a:t>AI can fuel new business models (</a:t>
+            </a:r>
+            <a:r>
+              <a:rPr lang="en-GB" sz="2000" dirty="0" err="1">
+                <a:latin typeface="Suisse Int'l" panose="020B0804000000000000" pitchFamily="34" charset="77"/>
+              </a:rPr>
+              <a:t>Iansiti</a:t>
+            </a:r>
+            <a:r>
+              <a:rPr lang="en-GB" sz="2000" dirty="0">
+                <a:latin typeface="Suisse Int'l" panose="020B0804000000000000" pitchFamily="34" charset="77"/>
+              </a:rPr>
+              <a:t> &amp; Lakhani, 2020)</a:t>
+            </a:r>
+          </a:p>
+          <a:p>
+            <a:pPr>
+              <a:lnSpc>
+                <a:spcPct val="120000"/>
+              </a:lnSpc>
+            </a:pPr>
+            <a:endParaRPr lang="en-GB" sz="2000" dirty="0">
+              <a:latin typeface="Suisse Int'l" panose="020B0804000000000000" pitchFamily="34" charset="77"/>
+            </a:endParaRPr>
+          </a:p>
+          <a:p>
+            <a:pPr>
+              <a:lnSpc>
+                <a:spcPct val="120000"/>
+              </a:lnSpc>
+            </a:pPr>
+            <a:endParaRPr lang="en-GB" sz="2000" dirty="0">
+              <a:latin typeface="Suisse Int'l" panose="020B0804000000000000" pitchFamily="34" charset="77"/>
+            </a:endParaRPr>
+          </a:p>
+        </p:txBody>
+      </p:sp>
+    </p:spTree>
+    <p:extLst>
+      <p:ext uri="{BB962C8B-B14F-4D97-AF65-F5344CB8AC3E}">
+        <p14:creationId xmlns:p14="http://schemas.microsoft.com/office/powerpoint/2010/main" val="597251450"/>
+      </p:ext>
+    </p:extLst>
+  </p:cSld>
+  <p:clrMapOvr>
+    <a:masterClrMapping/>
+  </p:clrMapOvr>
+</p:sld>
+</file>
+
 <file path=ppt/slides/slide22.xml><?xml version="1.0" encoding="utf-8"?>
 <p:sld xmlns:a="http://schemas.openxmlformats.org/drawingml/2006/main" xmlns:r="http://schemas.openxmlformats.org/officeDocument/2006/relationships" xmlns:p="http://schemas.openxmlformats.org/presentationml/2006/main">
   <p:cSld>
@@ -8372,231 +8423,6 @@
         </p:spPr>
         <p:txBody>
           <a:bodyPr>
-            <a:normAutofit/>
-          </a:bodyPr>
-          <a:lstStyle/>
-          <a:p>
-            <a:pPr>
-              <a:lnSpc>
-                <a:spcPct val="120000"/>
-              </a:lnSpc>
-            </a:pPr>
-            <a:r>
-              <a:rPr lang="en-GB" sz="2000" dirty="0">
-                <a:latin typeface="Suisse Int'l" panose="020B0804000000000000" pitchFamily="34" charset="77"/>
-              </a:rPr>
-              <a:t>Davenport (2018):</a:t>
-            </a:r>
-          </a:p>
-          <a:p>
-            <a:pPr lvl="1">
-              <a:lnSpc>
-                <a:spcPct val="120000"/>
-              </a:lnSpc>
-            </a:pPr>
-            <a:r>
-              <a:rPr lang="en-GB" sz="2000" dirty="0">
-                <a:latin typeface="Suisse Int'l" panose="020B0804000000000000" pitchFamily="34" charset="77"/>
-              </a:rPr>
-              <a:t>AI primarily used by large enterprises, technology companies, AI start-ups</a:t>
-            </a:r>
-          </a:p>
-          <a:p>
-            <a:pPr lvl="1">
-              <a:lnSpc>
-                <a:spcPct val="120000"/>
-              </a:lnSpc>
-            </a:pPr>
-            <a:r>
-              <a:rPr lang="en-GB" sz="2000" dirty="0">
-                <a:latin typeface="Suisse Int'l" panose="020B0804000000000000" pitchFamily="34" charset="77"/>
-              </a:rPr>
-              <a:t>AI capabilities:</a:t>
-            </a:r>
-          </a:p>
-          <a:p>
-            <a:pPr lvl="2">
-              <a:lnSpc>
-                <a:spcPct val="120000"/>
-              </a:lnSpc>
-            </a:pPr>
-            <a:r>
-              <a:rPr lang="en-GB" dirty="0">
-                <a:latin typeface="Suisse Int'l" panose="020B0804000000000000" pitchFamily="34" charset="77"/>
-              </a:rPr>
-              <a:t>robotics and robotic process automation (RPA)</a:t>
-            </a:r>
-          </a:p>
-          <a:p>
-            <a:pPr lvl="2">
-              <a:lnSpc>
-                <a:spcPct val="120000"/>
-              </a:lnSpc>
-            </a:pPr>
-            <a:r>
-              <a:rPr lang="en-GB" dirty="0">
-                <a:latin typeface="Suisse Int'l" panose="020B0804000000000000" pitchFamily="34" charset="77"/>
-              </a:rPr>
-              <a:t>gaining insights from data through machine learning</a:t>
-            </a:r>
-          </a:p>
-          <a:p>
-            <a:pPr lvl="2">
-              <a:lnSpc>
-                <a:spcPct val="120000"/>
-              </a:lnSpc>
-            </a:pPr>
-            <a:r>
-              <a:rPr lang="en-GB" dirty="0">
-                <a:latin typeface="Suisse Int'l" panose="020B0804000000000000" pitchFamily="34" charset="77"/>
-              </a:rPr>
-              <a:t>AI-based engagement with employees, customers through chatbots or intelligent agents</a:t>
-            </a:r>
-          </a:p>
-          <a:p>
-            <a:pPr>
-              <a:lnSpc>
-                <a:spcPct val="120000"/>
-              </a:lnSpc>
-            </a:pPr>
-            <a:r>
-              <a:rPr lang="en-GB" sz="2000" dirty="0">
-                <a:latin typeface="Suisse Int'l" panose="020B0804000000000000" pitchFamily="34" charset="77"/>
-              </a:rPr>
-              <a:t>AI can fuel new business models (</a:t>
-            </a:r>
-            <a:r>
-              <a:rPr lang="en-GB" sz="2000" dirty="0" err="1">
-                <a:latin typeface="Suisse Int'l" panose="020B0804000000000000" pitchFamily="34" charset="77"/>
-              </a:rPr>
-              <a:t>Iansiti</a:t>
-            </a:r>
-            <a:r>
-              <a:rPr lang="en-GB" sz="2000" dirty="0">
-                <a:latin typeface="Suisse Int'l" panose="020B0804000000000000" pitchFamily="34" charset="77"/>
-              </a:rPr>
-              <a:t> &amp; Lakhani, 2020)</a:t>
-            </a:r>
-          </a:p>
-          <a:p>
-            <a:pPr>
-              <a:lnSpc>
-                <a:spcPct val="120000"/>
-              </a:lnSpc>
-            </a:pPr>
-            <a:endParaRPr lang="en-GB" sz="2000" dirty="0">
-              <a:latin typeface="Suisse Int'l" panose="020B0804000000000000" pitchFamily="34" charset="77"/>
-            </a:endParaRPr>
-          </a:p>
-          <a:p>
-            <a:pPr>
-              <a:lnSpc>
-                <a:spcPct val="120000"/>
-              </a:lnSpc>
-            </a:pPr>
-            <a:endParaRPr lang="en-GB" sz="2000" dirty="0">
-              <a:latin typeface="Suisse Int'l" panose="020B0804000000000000" pitchFamily="34" charset="77"/>
-            </a:endParaRPr>
-          </a:p>
-        </p:txBody>
-      </p:sp>
-    </p:spTree>
-    <p:extLst>
-      <p:ext uri="{BB962C8B-B14F-4D97-AF65-F5344CB8AC3E}">
-        <p14:creationId xmlns:p14="http://schemas.microsoft.com/office/powerpoint/2010/main" val="597251450"/>
-      </p:ext>
-    </p:extLst>
-  </p:cSld>
-  <p:clrMapOvr>
-    <a:masterClrMapping/>
-  </p:clrMapOvr>
-</p:sld>
-</file>
-
-<file path=ppt/slides/slide23.xml><?xml version="1.0" encoding="utf-8"?>
-<p:sld xmlns:a="http://schemas.openxmlformats.org/drawingml/2006/main" xmlns:r="http://schemas.openxmlformats.org/officeDocument/2006/relationships" xmlns:p="http://schemas.openxmlformats.org/presentationml/2006/main">
-  <p:cSld>
-    <p:spTree>
-      <p:nvGrpSpPr>
-        <p:cNvPr id="1" name=""/>
-        <p:cNvGrpSpPr/>
-        <p:nvPr/>
-      </p:nvGrpSpPr>
-      <p:grpSpPr>
-        <a:xfrm>
-          <a:off x="0" y="0"/>
-          <a:ext cx="0" cy="0"/>
-          <a:chOff x="0" y="0"/>
-          <a:chExt cx="0" cy="0"/>
-        </a:xfrm>
-      </p:grpSpPr>
-      <p:sp>
-        <p:nvSpPr>
-          <p:cNvPr id="2" name="Title 1">
-            <a:extLst>
-              <a:ext uri="{FF2B5EF4-FFF2-40B4-BE49-F238E27FC236}">
-                <a16:creationId xmlns:a16="http://schemas.microsoft.com/office/drawing/2014/main" id="{C0622663-679C-370A-4B6D-51377AAE404F}"/>
-              </a:ext>
-            </a:extLst>
-          </p:cNvPr>
-          <p:cNvSpPr>
-            <a:spLocks noGrp="1"/>
-          </p:cNvSpPr>
-          <p:nvPr>
-            <p:ph type="title"/>
-          </p:nvPr>
-        </p:nvSpPr>
-        <p:spPr/>
-        <p:txBody>
-          <a:bodyPr vert="horz" lIns="91440" tIns="45720" rIns="91440" bIns="45720" rtlCol="0">
-            <a:normAutofit/>
-          </a:bodyPr>
-          <a:lstStyle/>
-          <a:p>
-            <a:pPr>
-              <a:lnSpc>
-                <a:spcPct val="130000"/>
-              </a:lnSpc>
-              <a:spcBef>
-                <a:spcPts val="1000"/>
-              </a:spcBef>
-              <a:buFont typeface="Arial" panose="020B0604020202020204" pitchFamily="34" charset="0"/>
-            </a:pPr>
-            <a:r>
-              <a:rPr lang="en-CH" sz="3600" b="1" dirty="0">
-                <a:latin typeface="Book Antiqua" panose="02040602050305030304" pitchFamily="18" charset="0"/>
-                <a:ea typeface="+mn-ea"/>
-                <a:cs typeface="+mn-cs"/>
-              </a:rPr>
-              <a:t>Competitive Advantage of AI</a:t>
-            </a:r>
-          </a:p>
-        </p:txBody>
-      </p:sp>
-      <p:sp>
-        <p:nvSpPr>
-          <p:cNvPr id="3" name="Content Placeholder 2">
-            <a:extLst>
-              <a:ext uri="{FF2B5EF4-FFF2-40B4-BE49-F238E27FC236}">
-                <a16:creationId xmlns:a16="http://schemas.microsoft.com/office/drawing/2014/main" id="{D16006F8-C647-AF45-AEE7-0D7868ACAAE9}"/>
-              </a:ext>
-            </a:extLst>
-          </p:cNvPr>
-          <p:cNvSpPr>
-            <a:spLocks noGrp="1"/>
-          </p:cNvSpPr>
-          <p:nvPr>
-            <p:ph idx="1"/>
-          </p:nvPr>
-        </p:nvSpPr>
-        <p:spPr>
-          <a:xfrm>
-            <a:off x="838200" y="1825625"/>
-            <a:ext cx="10515600" cy="4351338"/>
-          </a:xfrm>
-        </p:spPr>
-        <p:txBody>
-          <a:bodyPr>
             <a:noAutofit/>
           </a:bodyPr>
           <a:lstStyle/>
@@ -8733,7 +8559,7 @@
 </p:sld>
 </file>
 
-<file path=ppt/slides/slide24.xml><?xml version="1.0" encoding="utf-8"?>
+<file path=ppt/slides/slide23.xml><?xml version="1.0" encoding="utf-8"?>
 <p:sld xmlns:a="http://schemas.openxmlformats.org/drawingml/2006/main" xmlns:r="http://schemas.openxmlformats.org/officeDocument/2006/relationships" xmlns:p="http://schemas.openxmlformats.org/presentationml/2006/main">
   <p:cSld>
     <p:bg>
@@ -8897,6 +8723,270 @@
 </p:sld>
 </file>
 
+<file path=ppt/slides/slide24.xml><?xml version="1.0" encoding="utf-8"?>
+<p:sld xmlns:a="http://schemas.openxmlformats.org/drawingml/2006/main" xmlns:r="http://schemas.openxmlformats.org/officeDocument/2006/relationships" xmlns:p="http://schemas.openxmlformats.org/presentationml/2006/main">
+  <p:cSld>
+    <p:spTree>
+      <p:nvGrpSpPr>
+        <p:cNvPr id="1" name=""/>
+        <p:cNvGrpSpPr/>
+        <p:nvPr/>
+      </p:nvGrpSpPr>
+      <p:grpSpPr>
+        <a:xfrm>
+          <a:off x="0" y="0"/>
+          <a:ext cx="0" cy="0"/>
+          <a:chOff x="0" y="0"/>
+          <a:chExt cx="0" cy="0"/>
+        </a:xfrm>
+      </p:grpSpPr>
+      <p:sp>
+        <p:nvSpPr>
+          <p:cNvPr id="2" name="Title 1">
+            <a:extLst>
+              <a:ext uri="{FF2B5EF4-FFF2-40B4-BE49-F238E27FC236}">
+                <a16:creationId xmlns:a16="http://schemas.microsoft.com/office/drawing/2014/main" id="{C0622663-679C-370A-4B6D-51377AAE404F}"/>
+              </a:ext>
+            </a:extLst>
+          </p:cNvPr>
+          <p:cNvSpPr>
+            <a:spLocks noGrp="1"/>
+          </p:cNvSpPr>
+          <p:nvPr>
+            <p:ph type="title"/>
+          </p:nvPr>
+        </p:nvSpPr>
+        <p:spPr/>
+        <p:txBody>
+          <a:bodyPr vert="horz" lIns="91440" tIns="45720" rIns="91440" bIns="45720" rtlCol="0">
+            <a:normAutofit/>
+          </a:bodyPr>
+          <a:lstStyle/>
+          <a:p>
+            <a:pPr>
+              <a:lnSpc>
+                <a:spcPct val="130000"/>
+              </a:lnSpc>
+              <a:spcBef>
+                <a:spcPts val="1000"/>
+              </a:spcBef>
+              <a:buFont typeface="Arial" panose="020B0604020202020204" pitchFamily="34" charset="0"/>
+            </a:pPr>
+            <a:r>
+              <a:rPr lang="en-CH" sz="3600" b="1" dirty="0">
+                <a:latin typeface="Book Antiqua" panose="02040602050305030304" pitchFamily="18" charset="0"/>
+                <a:ea typeface="+mn-ea"/>
+                <a:cs typeface="+mn-cs"/>
+              </a:rPr>
+              <a:t>Instructions</a:t>
+            </a:r>
+          </a:p>
+        </p:txBody>
+      </p:sp>
+      <p:sp>
+        <p:nvSpPr>
+          <p:cNvPr id="3" name="Content Placeholder 2">
+            <a:extLst>
+              <a:ext uri="{FF2B5EF4-FFF2-40B4-BE49-F238E27FC236}">
+                <a16:creationId xmlns:a16="http://schemas.microsoft.com/office/drawing/2014/main" id="{D16006F8-C647-AF45-AEE7-0D7868ACAAE9}"/>
+              </a:ext>
+            </a:extLst>
+          </p:cNvPr>
+          <p:cNvSpPr>
+            <a:spLocks noGrp="1"/>
+          </p:cNvSpPr>
+          <p:nvPr>
+            <p:ph idx="1"/>
+          </p:nvPr>
+        </p:nvSpPr>
+        <p:spPr>
+          <a:xfrm>
+            <a:off x="838200" y="1825625"/>
+            <a:ext cx="10515600" cy="4351338"/>
+          </a:xfrm>
+        </p:spPr>
+        <p:txBody>
+          <a:bodyPr>
+            <a:noAutofit/>
+          </a:bodyPr>
+          <a:lstStyle/>
+          <a:p>
+            <a:pPr>
+              <a:lnSpc>
+                <a:spcPct val="112000"/>
+              </a:lnSpc>
+            </a:pPr>
+            <a:r>
+              <a:rPr lang="en-GB" sz="2200" dirty="0">
+                <a:latin typeface="Suisse Int'l" panose="020B0804000000000000" pitchFamily="34" charset="77"/>
+              </a:rPr>
+              <a:t>We build 4 groups, ca. 6-7 persons each</a:t>
+            </a:r>
+          </a:p>
+          <a:p>
+            <a:pPr>
+              <a:lnSpc>
+                <a:spcPct val="112000"/>
+              </a:lnSpc>
+            </a:pPr>
+            <a:r>
+              <a:rPr lang="en-GB" sz="2200" dirty="0">
+                <a:latin typeface="Suisse Int'l" panose="020B0804000000000000" pitchFamily="34" charset="77"/>
+              </a:rPr>
+              <a:t>Go to Teams channel for </a:t>
+            </a:r>
+            <a:r>
+              <a:rPr lang="en-GB" sz="2200" dirty="0">
+                <a:latin typeface="Suisse Int'l Light Italic" panose="020B0304000000000000" pitchFamily="34" charset="-78"/>
+                <a:cs typeface="Suisse Int'l Light Italic" panose="020B0304000000000000" pitchFamily="34" charset="-78"/>
+              </a:rPr>
+              <a:t>Emerging Topics &gt; Files &gt; </a:t>
+            </a:r>
+            <a:r>
+              <a:rPr lang="en-GB" sz="2200" dirty="0" err="1">
+                <a:latin typeface="Suisse Int'l Light Italic" panose="020B0304000000000000" pitchFamily="34" charset="-78"/>
+                <a:cs typeface="Suisse Int'l Light Italic" panose="020B0304000000000000" pitchFamily="34" charset="-78"/>
+              </a:rPr>
+              <a:t>Workshop_Didi</a:t>
+            </a:r>
+            <a:endParaRPr lang="en-GB" sz="2200" dirty="0">
+              <a:latin typeface="Suisse Int'l Light Italic" panose="020B0304000000000000" pitchFamily="34" charset="-78"/>
+              <a:cs typeface="Suisse Int'l Light Italic" panose="020B0304000000000000" pitchFamily="34" charset="-78"/>
+            </a:endParaRPr>
+          </a:p>
+          <a:p>
+            <a:pPr lvl="1">
+              <a:lnSpc>
+                <a:spcPct val="112000"/>
+              </a:lnSpc>
+            </a:pPr>
+            <a:r>
+              <a:rPr lang="en-GB" sz="2000" dirty="0">
+                <a:latin typeface="Suisse Int'l" panose="020B0804000000000000" pitchFamily="34" charset="77"/>
+              </a:rPr>
+              <a:t>Read the _</a:t>
+            </a:r>
+            <a:r>
+              <a:rPr lang="en-GB" sz="2000" dirty="0" err="1">
+                <a:latin typeface="Suisse Int'l" panose="020B0804000000000000" pitchFamily="34" charset="77"/>
+              </a:rPr>
+              <a:t>Group_Assignments.pdf</a:t>
+            </a:r>
+            <a:endParaRPr lang="en-GB" sz="2000" dirty="0">
+              <a:latin typeface="Suisse Int'l" panose="020B0804000000000000" pitchFamily="34" charset="77"/>
+            </a:endParaRPr>
+          </a:p>
+          <a:p>
+            <a:pPr lvl="1">
+              <a:lnSpc>
+                <a:spcPct val="112000"/>
+              </a:lnSpc>
+            </a:pPr>
+            <a:r>
+              <a:rPr lang="en-GB" sz="2000" dirty="0">
+                <a:latin typeface="Suisse Int'l" panose="020B0804000000000000" pitchFamily="34" charset="77"/>
+              </a:rPr>
+              <a:t>A </a:t>
+            </a:r>
+            <a:r>
+              <a:rPr lang="en-GB" sz="2000" dirty="0" err="1">
+                <a:latin typeface="Suisse Int'l" panose="020B0804000000000000" pitchFamily="34" charset="77"/>
+              </a:rPr>
+              <a:t>Powerpoint</a:t>
+            </a:r>
+            <a:r>
+              <a:rPr lang="en-GB" sz="2000" dirty="0">
+                <a:latin typeface="Suisse Int'l" panose="020B0804000000000000" pitchFamily="34" charset="77"/>
+              </a:rPr>
+              <a:t> file is prepared for each group to record your results</a:t>
+            </a:r>
+          </a:p>
+          <a:p>
+            <a:pPr lvl="1">
+              <a:lnSpc>
+                <a:spcPct val="112000"/>
+              </a:lnSpc>
+            </a:pPr>
+            <a:r>
+              <a:rPr lang="en-GB" sz="2000" dirty="0">
+                <a:latin typeface="Suisse Int'l" panose="020B0804000000000000" pitchFamily="34" charset="77"/>
+              </a:rPr>
+              <a:t>Each group is confronted with a scenario (see your group’s </a:t>
+            </a:r>
+            <a:r>
+              <a:rPr lang="en-GB" sz="2000" dirty="0" err="1">
+                <a:latin typeface="Suisse Int'l" panose="020B0804000000000000" pitchFamily="34" charset="77"/>
+              </a:rPr>
+              <a:t>powerpoint</a:t>
+            </a:r>
+            <a:r>
+              <a:rPr lang="en-GB" sz="2000" dirty="0">
+                <a:latin typeface="Suisse Int'l" panose="020B0804000000000000" pitchFamily="34" charset="77"/>
+              </a:rPr>
+              <a:t>!)</a:t>
+            </a:r>
+          </a:p>
+          <a:p>
+            <a:pPr lvl="1">
+              <a:lnSpc>
+                <a:spcPct val="112000"/>
+              </a:lnSpc>
+            </a:pPr>
+            <a:r>
+              <a:rPr lang="en-GB" sz="2000" dirty="0">
+                <a:latin typeface="Suisse Int'l" panose="020B0804000000000000" pitchFamily="34" charset="77"/>
+              </a:rPr>
+              <a:t>Discuss and reason about the adaptive, hybrid AI use case in the group, and</a:t>
+            </a:r>
+            <a:br>
+              <a:rPr lang="en-GB" sz="2000" dirty="0">
+                <a:latin typeface="Suisse Int'l" panose="020B0804000000000000" pitchFamily="34" charset="77"/>
+              </a:rPr>
+            </a:br>
+            <a:r>
+              <a:rPr lang="en-GB" sz="2000" dirty="0">
+                <a:latin typeface="Suisse Int'l" panose="020B0804000000000000" pitchFamily="34" charset="77"/>
+              </a:rPr>
+              <a:t>to what type of competitive advantage this could lead.</a:t>
+            </a:r>
+          </a:p>
+          <a:p>
+            <a:pPr lvl="1">
+              <a:lnSpc>
+                <a:spcPct val="112000"/>
+              </a:lnSpc>
+            </a:pPr>
+            <a:r>
+              <a:rPr lang="en-GB" sz="2000" dirty="0">
+                <a:latin typeface="Suisse Int'l" panose="020B0804000000000000" pitchFamily="34" charset="77"/>
+              </a:rPr>
+              <a:t>Record your results in the </a:t>
+            </a:r>
+            <a:r>
+              <a:rPr lang="en-GB" sz="2000" dirty="0" err="1">
+                <a:latin typeface="Suisse Int'l" panose="020B0804000000000000" pitchFamily="34" charset="77"/>
+              </a:rPr>
+              <a:t>powerpoint</a:t>
+            </a:r>
+            <a:endParaRPr lang="en-GB" sz="2000" dirty="0">
+              <a:latin typeface="Suisse Int'l" panose="020B0804000000000000" pitchFamily="34" charset="77"/>
+            </a:endParaRPr>
+          </a:p>
+        </p:txBody>
+      </p:sp>
+    </p:spTree>
+    <p:extLst>
+      <p:ext uri="{BB962C8B-B14F-4D97-AF65-F5344CB8AC3E}">
+        <p14:creationId xmlns:p14="http://schemas.microsoft.com/office/powerpoint/2010/main" val="705386237"/>
+      </p:ext>
+    </p:extLst>
+  </p:cSld>
+  <p:clrMapOvr>
+    <a:masterClrMapping/>
+  </p:clrMapOvr>
+</p:sld>
+</file>
+
 <file path=ppt/slides/slide25.xml><?xml version="1.0" encoding="utf-8"?>
 <p:sld xmlns:a="http://schemas.openxmlformats.org/drawingml/2006/main" xmlns:r="http://schemas.openxmlformats.org/officeDocument/2006/relationships" xmlns:p="http://schemas.openxmlformats.org/presentationml/2006/main">
   <p:cSld>
@@ -8952,270 +9042,6 @@
                 <a:ea typeface="+mn-ea"/>
                 <a:cs typeface="+mn-cs"/>
               </a:rPr>
-              <a:t>Instructions</a:t>
-            </a:r>
-          </a:p>
-        </p:txBody>
-      </p:sp>
-      <p:sp>
-        <p:nvSpPr>
-          <p:cNvPr id="3" name="Content Placeholder 2">
-            <a:extLst>
-              <a:ext uri="{FF2B5EF4-FFF2-40B4-BE49-F238E27FC236}">
-                <a16:creationId xmlns:a16="http://schemas.microsoft.com/office/drawing/2014/main" id="{D16006F8-C647-AF45-AEE7-0D7868ACAAE9}"/>
-              </a:ext>
-            </a:extLst>
-          </p:cNvPr>
-          <p:cNvSpPr>
-            <a:spLocks noGrp="1"/>
-          </p:cNvSpPr>
-          <p:nvPr>
-            <p:ph idx="1"/>
-          </p:nvPr>
-        </p:nvSpPr>
-        <p:spPr>
-          <a:xfrm>
-            <a:off x="838200" y="1825625"/>
-            <a:ext cx="10515600" cy="4351338"/>
-          </a:xfrm>
-        </p:spPr>
-        <p:txBody>
-          <a:bodyPr>
-            <a:noAutofit/>
-          </a:bodyPr>
-          <a:lstStyle/>
-          <a:p>
-            <a:pPr>
-              <a:lnSpc>
-                <a:spcPct val="112000"/>
-              </a:lnSpc>
-            </a:pPr>
-            <a:r>
-              <a:rPr lang="en-GB" sz="2200" dirty="0">
-                <a:latin typeface="Suisse Int'l" panose="020B0804000000000000" pitchFamily="34" charset="77"/>
-              </a:rPr>
-              <a:t>We build 4 groups, ca. 6-7 persons each</a:t>
-            </a:r>
-          </a:p>
-          <a:p>
-            <a:pPr>
-              <a:lnSpc>
-                <a:spcPct val="112000"/>
-              </a:lnSpc>
-            </a:pPr>
-            <a:r>
-              <a:rPr lang="en-GB" sz="2200" dirty="0">
-                <a:latin typeface="Suisse Int'l" panose="020B0804000000000000" pitchFamily="34" charset="77"/>
-              </a:rPr>
-              <a:t>Go to Teams channel for </a:t>
-            </a:r>
-            <a:r>
-              <a:rPr lang="en-GB" sz="2200" dirty="0">
-                <a:latin typeface="Suisse Int'l Light Italic" panose="020B0304000000000000" pitchFamily="34" charset="-78"/>
-                <a:cs typeface="Suisse Int'l Light Italic" panose="020B0304000000000000" pitchFamily="34" charset="-78"/>
-              </a:rPr>
-              <a:t>Emerging Topics &gt; Files &gt; </a:t>
-            </a:r>
-            <a:r>
-              <a:rPr lang="en-GB" sz="2200" dirty="0" err="1">
-                <a:latin typeface="Suisse Int'l Light Italic" panose="020B0304000000000000" pitchFamily="34" charset="-78"/>
-                <a:cs typeface="Suisse Int'l Light Italic" panose="020B0304000000000000" pitchFamily="34" charset="-78"/>
-              </a:rPr>
-              <a:t>Workshop_Didi</a:t>
-            </a:r>
-            <a:endParaRPr lang="en-GB" sz="2200" dirty="0">
-              <a:latin typeface="Suisse Int'l Light Italic" panose="020B0304000000000000" pitchFamily="34" charset="-78"/>
-              <a:cs typeface="Suisse Int'l Light Italic" panose="020B0304000000000000" pitchFamily="34" charset="-78"/>
-            </a:endParaRPr>
-          </a:p>
-          <a:p>
-            <a:pPr lvl="1">
-              <a:lnSpc>
-                <a:spcPct val="112000"/>
-              </a:lnSpc>
-            </a:pPr>
-            <a:r>
-              <a:rPr lang="en-GB" sz="2000" dirty="0">
-                <a:latin typeface="Suisse Int'l" panose="020B0804000000000000" pitchFamily="34" charset="77"/>
-              </a:rPr>
-              <a:t>Read the _</a:t>
-            </a:r>
-            <a:r>
-              <a:rPr lang="en-GB" sz="2000" dirty="0" err="1">
-                <a:latin typeface="Suisse Int'l" panose="020B0804000000000000" pitchFamily="34" charset="77"/>
-              </a:rPr>
-              <a:t>Group_Assignments.pdf</a:t>
-            </a:r>
-            <a:endParaRPr lang="en-GB" sz="2000" dirty="0">
-              <a:latin typeface="Suisse Int'l" panose="020B0804000000000000" pitchFamily="34" charset="77"/>
-            </a:endParaRPr>
-          </a:p>
-          <a:p>
-            <a:pPr lvl="1">
-              <a:lnSpc>
-                <a:spcPct val="112000"/>
-              </a:lnSpc>
-            </a:pPr>
-            <a:r>
-              <a:rPr lang="en-GB" sz="2000" dirty="0">
-                <a:latin typeface="Suisse Int'l" panose="020B0804000000000000" pitchFamily="34" charset="77"/>
-              </a:rPr>
-              <a:t>A </a:t>
-            </a:r>
-            <a:r>
-              <a:rPr lang="en-GB" sz="2000" dirty="0" err="1">
-                <a:latin typeface="Suisse Int'l" panose="020B0804000000000000" pitchFamily="34" charset="77"/>
-              </a:rPr>
-              <a:t>Powerpoint</a:t>
-            </a:r>
-            <a:r>
-              <a:rPr lang="en-GB" sz="2000" dirty="0">
-                <a:latin typeface="Suisse Int'l" panose="020B0804000000000000" pitchFamily="34" charset="77"/>
-              </a:rPr>
-              <a:t> file is prepared for each group to record your results</a:t>
-            </a:r>
-          </a:p>
-          <a:p>
-            <a:pPr lvl="1">
-              <a:lnSpc>
-                <a:spcPct val="112000"/>
-              </a:lnSpc>
-            </a:pPr>
-            <a:r>
-              <a:rPr lang="en-GB" sz="2000" dirty="0">
-                <a:latin typeface="Suisse Int'l" panose="020B0804000000000000" pitchFamily="34" charset="77"/>
-              </a:rPr>
-              <a:t>Each group is confronted with a scenario (see your group’s </a:t>
-            </a:r>
-            <a:r>
-              <a:rPr lang="en-GB" sz="2000" dirty="0" err="1">
-                <a:latin typeface="Suisse Int'l" panose="020B0804000000000000" pitchFamily="34" charset="77"/>
-              </a:rPr>
-              <a:t>powerpoint</a:t>
-            </a:r>
-            <a:r>
-              <a:rPr lang="en-GB" sz="2000" dirty="0">
-                <a:latin typeface="Suisse Int'l" panose="020B0804000000000000" pitchFamily="34" charset="77"/>
-              </a:rPr>
-              <a:t>!)</a:t>
-            </a:r>
-          </a:p>
-          <a:p>
-            <a:pPr lvl="1">
-              <a:lnSpc>
-                <a:spcPct val="112000"/>
-              </a:lnSpc>
-            </a:pPr>
-            <a:r>
-              <a:rPr lang="en-GB" sz="2000" dirty="0">
-                <a:latin typeface="Suisse Int'l" panose="020B0804000000000000" pitchFamily="34" charset="77"/>
-              </a:rPr>
-              <a:t>Discuss and reason about the adaptive, hybrid AI use case in the group, and</a:t>
-            </a:r>
-            <a:br>
-              <a:rPr lang="en-GB" sz="2000" dirty="0">
-                <a:latin typeface="Suisse Int'l" panose="020B0804000000000000" pitchFamily="34" charset="77"/>
-              </a:rPr>
-            </a:br>
-            <a:r>
-              <a:rPr lang="en-GB" sz="2000" dirty="0">
-                <a:latin typeface="Suisse Int'l" panose="020B0804000000000000" pitchFamily="34" charset="77"/>
-              </a:rPr>
-              <a:t>to what type of competitive advantage this could lead.</a:t>
-            </a:r>
-          </a:p>
-          <a:p>
-            <a:pPr lvl="1">
-              <a:lnSpc>
-                <a:spcPct val="112000"/>
-              </a:lnSpc>
-            </a:pPr>
-            <a:r>
-              <a:rPr lang="en-GB" sz="2000" dirty="0">
-                <a:latin typeface="Suisse Int'l" panose="020B0804000000000000" pitchFamily="34" charset="77"/>
-              </a:rPr>
-              <a:t>Record your results in the </a:t>
-            </a:r>
-            <a:r>
-              <a:rPr lang="en-GB" sz="2000" dirty="0" err="1">
-                <a:latin typeface="Suisse Int'l" panose="020B0804000000000000" pitchFamily="34" charset="77"/>
-              </a:rPr>
-              <a:t>powerpoint</a:t>
-            </a:r>
-            <a:endParaRPr lang="en-GB" sz="2000" dirty="0">
-              <a:latin typeface="Suisse Int'l" panose="020B0804000000000000" pitchFamily="34" charset="77"/>
-            </a:endParaRPr>
-          </a:p>
-        </p:txBody>
-      </p:sp>
-    </p:spTree>
-    <p:extLst>
-      <p:ext uri="{BB962C8B-B14F-4D97-AF65-F5344CB8AC3E}">
-        <p14:creationId xmlns:p14="http://schemas.microsoft.com/office/powerpoint/2010/main" val="705386237"/>
-      </p:ext>
-    </p:extLst>
-  </p:cSld>
-  <p:clrMapOvr>
-    <a:masterClrMapping/>
-  </p:clrMapOvr>
-</p:sld>
-</file>
-
-<file path=ppt/slides/slide26.xml><?xml version="1.0" encoding="utf-8"?>
-<p:sld xmlns:a="http://schemas.openxmlformats.org/drawingml/2006/main" xmlns:r="http://schemas.openxmlformats.org/officeDocument/2006/relationships" xmlns:p="http://schemas.openxmlformats.org/presentationml/2006/main">
-  <p:cSld>
-    <p:spTree>
-      <p:nvGrpSpPr>
-        <p:cNvPr id="1" name=""/>
-        <p:cNvGrpSpPr/>
-        <p:nvPr/>
-      </p:nvGrpSpPr>
-      <p:grpSpPr>
-        <a:xfrm>
-          <a:off x="0" y="0"/>
-          <a:ext cx="0" cy="0"/>
-          <a:chOff x="0" y="0"/>
-          <a:chExt cx="0" cy="0"/>
-        </a:xfrm>
-      </p:grpSpPr>
-      <p:sp>
-        <p:nvSpPr>
-          <p:cNvPr id="2" name="Title 1">
-            <a:extLst>
-              <a:ext uri="{FF2B5EF4-FFF2-40B4-BE49-F238E27FC236}">
-                <a16:creationId xmlns:a16="http://schemas.microsoft.com/office/drawing/2014/main" id="{C0622663-679C-370A-4B6D-51377AAE404F}"/>
-              </a:ext>
-            </a:extLst>
-          </p:cNvPr>
-          <p:cNvSpPr>
-            <a:spLocks noGrp="1"/>
-          </p:cNvSpPr>
-          <p:nvPr>
-            <p:ph type="title"/>
-          </p:nvPr>
-        </p:nvSpPr>
-        <p:spPr/>
-        <p:txBody>
-          <a:bodyPr vert="horz" lIns="91440" tIns="45720" rIns="91440" bIns="45720" rtlCol="0">
-            <a:normAutofit/>
-          </a:bodyPr>
-          <a:lstStyle/>
-          <a:p>
-            <a:pPr>
-              <a:lnSpc>
-                <a:spcPct val="130000"/>
-              </a:lnSpc>
-              <a:spcBef>
-                <a:spcPts val="1000"/>
-              </a:spcBef>
-              <a:buFont typeface="Arial" panose="020B0604020202020204" pitchFamily="34" charset="0"/>
-            </a:pPr>
-            <a:r>
-              <a:rPr lang="en-CH" sz="3600" b="1" dirty="0">
-                <a:latin typeface="Book Antiqua" panose="02040602050305030304" pitchFamily="18" charset="0"/>
-                <a:ea typeface="+mn-ea"/>
-                <a:cs typeface="+mn-cs"/>
-              </a:rPr>
               <a:t>References (1/2)</a:t>
             </a:r>
           </a:p>
@@ -9570,7 +9396,7 @@
 </p:sld>
 </file>
 
-<file path=ppt/slides/slide27.xml><?xml version="1.0" encoding="utf-8"?>
+<file path=ppt/slides/slide26.xml><?xml version="1.0" encoding="utf-8"?>
 <p:sld xmlns:a="http://schemas.openxmlformats.org/drawingml/2006/main" xmlns:r="http://schemas.openxmlformats.org/officeDocument/2006/relationships" xmlns:p="http://schemas.openxmlformats.org/presentationml/2006/main">
   <p:cSld>
     <p:spTree>
@@ -10691,108 +10517,6 @@
 <file path=ppt/slides/slide7.xml><?xml version="1.0" encoding="utf-8"?>
 <p:sld xmlns:a="http://schemas.openxmlformats.org/drawingml/2006/main" xmlns:r="http://schemas.openxmlformats.org/officeDocument/2006/relationships" xmlns:p="http://schemas.openxmlformats.org/presentationml/2006/main">
   <p:cSld>
-    <p:spTree>
-      <p:nvGrpSpPr>
-        <p:cNvPr id="1" name=""/>
-        <p:cNvGrpSpPr/>
-        <p:nvPr/>
-      </p:nvGrpSpPr>
-      <p:grpSpPr>
-        <a:xfrm>
-          <a:off x="0" y="0"/>
-          <a:ext cx="0" cy="0"/>
-          <a:chOff x="0" y="0"/>
-          <a:chExt cx="0" cy="0"/>
-        </a:xfrm>
-      </p:grpSpPr>
-      <p:sp>
-        <p:nvSpPr>
-          <p:cNvPr id="2" name="Title 1">
-            <a:extLst>
-              <a:ext uri="{FF2B5EF4-FFF2-40B4-BE49-F238E27FC236}">
-                <a16:creationId xmlns:a16="http://schemas.microsoft.com/office/drawing/2014/main" id="{C0622663-679C-370A-4B6D-51377AAE404F}"/>
-              </a:ext>
-            </a:extLst>
-          </p:cNvPr>
-          <p:cNvSpPr>
-            <a:spLocks noGrp="1"/>
-          </p:cNvSpPr>
-          <p:nvPr>
-            <p:ph type="title"/>
-          </p:nvPr>
-        </p:nvSpPr>
-        <p:spPr/>
-        <p:txBody>
-          <a:bodyPr vert="horz" lIns="91440" tIns="45720" rIns="91440" bIns="45720" rtlCol="0">
-            <a:normAutofit/>
-          </a:bodyPr>
-          <a:lstStyle/>
-          <a:p>
-            <a:pPr>
-              <a:lnSpc>
-                <a:spcPct val="130000"/>
-              </a:lnSpc>
-              <a:spcBef>
-                <a:spcPts val="1000"/>
-              </a:spcBef>
-              <a:buFont typeface="Arial" panose="020B0604020202020204" pitchFamily="34" charset="0"/>
-            </a:pPr>
-            <a:r>
-              <a:rPr lang="en-CH" sz="3600" b="1" dirty="0">
-                <a:latin typeface="Book Antiqua" panose="02040602050305030304" pitchFamily="18" charset="0"/>
-                <a:ea typeface="+mn-ea"/>
-                <a:cs typeface="+mn-cs"/>
-              </a:rPr>
-              <a:t>From AI to Hybrid Intelligence</a:t>
-            </a:r>
-          </a:p>
-        </p:txBody>
-      </p:sp>
-      <p:pic>
-        <p:nvPicPr>
-          <p:cNvPr id="9" name="Picture 8">
-            <a:extLst>
-              <a:ext uri="{FF2B5EF4-FFF2-40B4-BE49-F238E27FC236}">
-                <a16:creationId xmlns:a16="http://schemas.microsoft.com/office/drawing/2014/main" id="{DD2702A5-BF59-D817-DED0-F90B364F20EB}"/>
-              </a:ext>
-            </a:extLst>
-          </p:cNvPr>
-          <p:cNvPicPr>
-            <a:picLocks noChangeAspect="1"/>
-          </p:cNvPicPr>
-          <p:nvPr/>
-        </p:nvPicPr>
-        <p:blipFill rotWithShape="1">
-          <a:blip r:embed="rId2"/>
-          <a:srcRect l="4143" r="9541"/>
-          <a:stretch/>
-        </p:blipFill>
-        <p:spPr>
-          <a:xfrm>
-            <a:off x="514227" y="1642004"/>
-            <a:ext cx="11301536" cy="3987272"/>
-          </a:xfrm>
-          <a:prstGeom prst="rect">
-            <a:avLst/>
-          </a:prstGeom>
-        </p:spPr>
-      </p:pic>
-    </p:spTree>
-    <p:extLst>
-      <p:ext uri="{BB962C8B-B14F-4D97-AF65-F5344CB8AC3E}">
-        <p14:creationId xmlns:p14="http://schemas.microsoft.com/office/powerpoint/2010/main" val="46047966"/>
-      </p:ext>
-    </p:extLst>
-  </p:cSld>
-  <p:clrMapOvr>
-    <a:masterClrMapping/>
-  </p:clrMapOvr>
-</p:sld>
-</file>
-
-<file path=ppt/slides/slide8.xml><?xml version="1.0" encoding="utf-8"?>
-<p:sld xmlns:a="http://schemas.openxmlformats.org/drawingml/2006/main" xmlns:r="http://schemas.openxmlformats.org/officeDocument/2006/relationships" xmlns:p="http://schemas.openxmlformats.org/presentationml/2006/main">
-  <p:cSld>
     <p:bg>
       <p:bgPr>
         <a:solidFill>
@@ -10954,6 +10678,226 @@
 </p:sld>
 </file>
 
+<file path=ppt/slides/slide8.xml><?xml version="1.0" encoding="utf-8"?>
+<p:sld xmlns:a="http://schemas.openxmlformats.org/drawingml/2006/main" xmlns:r="http://schemas.openxmlformats.org/officeDocument/2006/relationships" xmlns:p="http://schemas.openxmlformats.org/presentationml/2006/main">
+  <p:cSld>
+    <p:spTree>
+      <p:nvGrpSpPr>
+        <p:cNvPr id="1" name=""/>
+        <p:cNvGrpSpPr/>
+        <p:nvPr/>
+      </p:nvGrpSpPr>
+      <p:grpSpPr>
+        <a:xfrm>
+          <a:off x="0" y="0"/>
+          <a:ext cx="0" cy="0"/>
+          <a:chOff x="0" y="0"/>
+          <a:chExt cx="0" cy="0"/>
+        </a:xfrm>
+      </p:grpSpPr>
+      <p:sp>
+        <p:nvSpPr>
+          <p:cNvPr id="2" name="Title 1">
+            <a:extLst>
+              <a:ext uri="{FF2B5EF4-FFF2-40B4-BE49-F238E27FC236}">
+                <a16:creationId xmlns:a16="http://schemas.microsoft.com/office/drawing/2014/main" id="{C0622663-679C-370A-4B6D-51377AAE404F}"/>
+              </a:ext>
+            </a:extLst>
+          </p:cNvPr>
+          <p:cNvSpPr>
+            <a:spLocks noGrp="1"/>
+          </p:cNvSpPr>
+          <p:nvPr>
+            <p:ph type="title"/>
+          </p:nvPr>
+        </p:nvSpPr>
+        <p:spPr/>
+        <p:txBody>
+          <a:bodyPr vert="horz" lIns="91440" tIns="45720" rIns="91440" bIns="45720" rtlCol="0">
+            <a:normAutofit/>
+          </a:bodyPr>
+          <a:lstStyle/>
+          <a:p>
+            <a:pPr>
+              <a:lnSpc>
+                <a:spcPct val="130000"/>
+              </a:lnSpc>
+              <a:spcBef>
+                <a:spcPts val="1000"/>
+              </a:spcBef>
+              <a:buFont typeface="Arial" panose="020B0604020202020204" pitchFamily="34" charset="0"/>
+            </a:pPr>
+            <a:r>
+              <a:rPr lang="en-CH" sz="3600" b="1" dirty="0">
+                <a:latin typeface="Book Antiqua" panose="02040602050305030304" pitchFamily="18" charset="0"/>
+                <a:ea typeface="+mn-ea"/>
+                <a:cs typeface="+mn-cs"/>
+              </a:rPr>
+              <a:t>Adaptive AI Systems</a:t>
+            </a:r>
+          </a:p>
+        </p:txBody>
+      </p:sp>
+      <p:sp>
+        <p:nvSpPr>
+          <p:cNvPr id="3" name="Content Placeholder 2">
+            <a:extLst>
+              <a:ext uri="{FF2B5EF4-FFF2-40B4-BE49-F238E27FC236}">
+                <a16:creationId xmlns:a16="http://schemas.microsoft.com/office/drawing/2014/main" id="{D16006F8-C647-AF45-AEE7-0D7868ACAAE9}"/>
+              </a:ext>
+            </a:extLst>
+          </p:cNvPr>
+          <p:cNvSpPr>
+            <a:spLocks noGrp="1"/>
+          </p:cNvSpPr>
+          <p:nvPr>
+            <p:ph idx="1"/>
+          </p:nvPr>
+        </p:nvSpPr>
+        <p:spPr>
+          <a:xfrm>
+            <a:off x="838200" y="1825625"/>
+            <a:ext cx="10515600" cy="4351338"/>
+          </a:xfrm>
+        </p:spPr>
+        <p:txBody>
+          <a:bodyPr>
+            <a:normAutofit/>
+          </a:bodyPr>
+          <a:lstStyle/>
+          <a:p>
+            <a:pPr>
+              <a:lnSpc>
+                <a:spcPct val="117000"/>
+              </a:lnSpc>
+            </a:pPr>
+            <a:r>
+              <a:rPr lang="en-GB" sz="2000" dirty="0">
+                <a:latin typeface="Suisse Int'l" panose="020B0804000000000000" pitchFamily="34" charset="77"/>
+              </a:rPr>
+              <a:t>Human-aware AI systems should </a:t>
+            </a:r>
+            <a:r>
+              <a:rPr lang="en-GB" sz="2000" b="1" u="sng" dirty="0">
+                <a:latin typeface="Suisse Int'l Semi Bold" panose="020B0804000000000000" pitchFamily="34" charset="77"/>
+              </a:rPr>
+              <a:t>adapt</a:t>
+            </a:r>
+            <a:r>
+              <a:rPr lang="en-GB" sz="2000" dirty="0">
+                <a:latin typeface="Suisse Int'l" panose="020B0804000000000000" pitchFamily="34" charset="77"/>
+              </a:rPr>
+              <a:t> to (based on non-exhaustive literature review):</a:t>
+            </a:r>
+            <a:br>
+              <a:rPr lang="en-GB" sz="2000" dirty="0">
+                <a:latin typeface="Suisse Int'l" panose="020B0804000000000000" pitchFamily="34" charset="77"/>
+              </a:rPr>
+            </a:br>
+            <a:endParaRPr lang="en-GB" sz="2000" dirty="0">
+              <a:latin typeface="Suisse Int'l" panose="020B0804000000000000" pitchFamily="34" charset="77"/>
+            </a:endParaRPr>
+          </a:p>
+          <a:p>
+            <a:pPr marL="914400" lvl="1" indent="-457200">
+              <a:lnSpc>
+                <a:spcPct val="117000"/>
+              </a:lnSpc>
+              <a:buFont typeface="+mj-lt"/>
+              <a:buAutoNum type="arabicParenR"/>
+            </a:pPr>
+            <a:r>
+              <a:rPr lang="en-GB" sz="2000" dirty="0">
+                <a:latin typeface="Suisse Int'l" panose="020B0804000000000000" pitchFamily="34" charset="77"/>
+              </a:rPr>
+              <a:t>Different user’s needs</a:t>
+            </a:r>
+          </a:p>
+          <a:p>
+            <a:pPr marL="914400" lvl="1" indent="-457200">
+              <a:lnSpc>
+                <a:spcPct val="117000"/>
+              </a:lnSpc>
+              <a:buFont typeface="+mj-lt"/>
+              <a:buAutoNum type="arabicParenR"/>
+            </a:pPr>
+            <a:r>
+              <a:rPr lang="en-GB" sz="2000" dirty="0">
+                <a:latin typeface="Suisse Int'l" panose="020B0804000000000000" pitchFamily="34" charset="77"/>
+              </a:rPr>
+              <a:t>Various user tasks</a:t>
+            </a:r>
+          </a:p>
+          <a:p>
+            <a:pPr marL="914400" lvl="1" indent="-457200">
+              <a:lnSpc>
+                <a:spcPct val="117000"/>
+              </a:lnSpc>
+              <a:buFont typeface="+mj-lt"/>
+              <a:buAutoNum type="arabicParenR"/>
+            </a:pPr>
+            <a:r>
+              <a:rPr lang="en-GB" sz="2000" dirty="0">
+                <a:latin typeface="Suisse Int'l" panose="020B0804000000000000" pitchFamily="34" charset="77"/>
+              </a:rPr>
+              <a:t>Joint task completion</a:t>
+            </a:r>
+          </a:p>
+          <a:p>
+            <a:pPr marL="914400" lvl="1" indent="-457200">
+              <a:lnSpc>
+                <a:spcPct val="117000"/>
+              </a:lnSpc>
+              <a:buFont typeface="+mj-lt"/>
+              <a:buAutoNum type="arabicParenR"/>
+            </a:pPr>
+            <a:r>
+              <a:rPr lang="en-GB" sz="2000" dirty="0">
+                <a:latin typeface="Suisse Int'l" panose="020B0804000000000000" pitchFamily="34" charset="77"/>
+              </a:rPr>
+              <a:t>Interactions with agents</a:t>
+            </a:r>
+          </a:p>
+          <a:p>
+            <a:pPr marL="914400" lvl="1" indent="-457200">
+              <a:lnSpc>
+                <a:spcPct val="117000"/>
+              </a:lnSpc>
+              <a:buFont typeface="+mj-lt"/>
+              <a:buAutoNum type="arabicParenR"/>
+            </a:pPr>
+            <a:r>
+              <a:rPr lang="en-GB" sz="2000" dirty="0">
+                <a:latin typeface="Suisse Int'l" panose="020B0804000000000000" pitchFamily="34" charset="77"/>
+              </a:rPr>
+              <a:t>Changing environment</a:t>
+            </a:r>
+          </a:p>
+          <a:p>
+            <a:pPr>
+              <a:lnSpc>
+                <a:spcPct val="117000"/>
+              </a:lnSpc>
+            </a:pPr>
+            <a:endParaRPr lang="en-GB" sz="2000" dirty="0">
+              <a:latin typeface="Suisse Int'l" panose="020B0804000000000000" pitchFamily="34" charset="77"/>
+            </a:endParaRPr>
+          </a:p>
+        </p:txBody>
+      </p:sp>
+    </p:spTree>
+    <p:extLst>
+      <p:ext uri="{BB962C8B-B14F-4D97-AF65-F5344CB8AC3E}">
+        <p14:creationId xmlns:p14="http://schemas.microsoft.com/office/powerpoint/2010/main" val="3639702267"/>
+      </p:ext>
+    </p:extLst>
+  </p:cSld>
+  <p:clrMapOvr>
+    <a:masterClrMapping/>
+  </p:clrMapOvr>
+</p:sld>
+</file>
+
 <file path=ppt/slides/slide9.xml><?xml version="1.0" encoding="utf-8"?>
 <p:sld xmlns:a="http://schemas.openxmlformats.org/drawingml/2006/main" xmlns:r="http://schemas.openxmlformats.org/officeDocument/2006/relationships" xmlns:p="http://schemas.openxmlformats.org/presentationml/2006/main">
   <p:cSld>
@@ -11009,7 +10953,7 @@
                 <a:ea typeface="+mn-ea"/>
                 <a:cs typeface="+mn-cs"/>
               </a:rPr>
-              <a:t>Adaptive AI Systems</a:t>
+              <a:t>Adaptive AI – 1) Different User Needs</a:t>
             </a:r>
           </a:p>
         </p:txBody>
@@ -11048,123 +10992,94 @@
               </a:lnSpc>
             </a:pPr>
             <a:r>
-              <a:rPr lang="en-GB" sz="2000" dirty="0">
-                <a:latin typeface="Suisse Int'l" panose="020B0804000000000000" pitchFamily="34" charset="77"/>
-              </a:rPr>
-              <a:t>Human-aware AI systems should </a:t>
-            </a:r>
-            <a:r>
-              <a:rPr lang="en-GB" sz="2000" b="1" u="sng" dirty="0">
+              <a:rPr lang="en-GB" sz="2400" dirty="0">
+                <a:latin typeface="Suisse Int'l" panose="020B0804000000000000" pitchFamily="34" charset="77"/>
+              </a:rPr>
+              <a:t>Recommender systems, think of Netflix recommendations</a:t>
+            </a:r>
+          </a:p>
+          <a:p>
+            <a:pPr>
+              <a:lnSpc>
+                <a:spcPct val="117000"/>
+              </a:lnSpc>
+            </a:pPr>
+            <a:r>
+              <a:rPr lang="en-GB" sz="2400" dirty="0">
+                <a:latin typeface="Suisse Int'l" panose="020B0804000000000000" pitchFamily="34" charset="77"/>
+              </a:rPr>
+              <a:t>Netflix should learn </a:t>
+            </a:r>
+            <a:r>
+              <a:rPr lang="en-GB" sz="2400" b="1" dirty="0">
+                <a:latin typeface="Suisse Int'l Semi Bold Italic" panose="020B0804000000000000" pitchFamily="34" charset="77"/>
+              </a:rPr>
+              <a:t>my</a:t>
+            </a:r>
+            <a:r>
+              <a:rPr lang="en-GB" sz="2400" dirty="0">
+                <a:latin typeface="Suisse Int'l" panose="020B0804000000000000" pitchFamily="34" charset="77"/>
+              </a:rPr>
+              <a:t> preferences</a:t>
+            </a:r>
+          </a:p>
+          <a:p>
+            <a:pPr>
+              <a:lnSpc>
+                <a:spcPct val="117000"/>
+              </a:lnSpc>
+            </a:pPr>
+            <a:r>
+              <a:rPr lang="en-GB" sz="2400" b="1" dirty="0">
                 <a:latin typeface="Suisse Int'l Semi Bold" panose="020B0804000000000000" pitchFamily="34" charset="77"/>
               </a:rPr>
-              <a:t>adapt</a:t>
-            </a:r>
-            <a:r>
-              <a:rPr lang="en-GB" sz="2000" dirty="0">
-                <a:latin typeface="Suisse Int'l" panose="020B0804000000000000" pitchFamily="34" charset="77"/>
-              </a:rPr>
-              <a:t> to (based on non-exhaustive literature review):</a:t>
-            </a:r>
-            <a:br>
-              <a:rPr lang="en-GB" sz="2000" dirty="0">
-                <a:latin typeface="Suisse Int'l" panose="020B0804000000000000" pitchFamily="34" charset="77"/>
-              </a:rPr>
-            </a:br>
-            <a:endParaRPr lang="en-GB" sz="2000" dirty="0">
-              <a:latin typeface="Suisse Int'l" panose="020B0804000000000000" pitchFamily="34" charset="77"/>
-            </a:endParaRPr>
-          </a:p>
-          <a:p>
-            <a:pPr marL="914400" lvl="1" indent="-457200">
+              <a:t>Cold-start problem</a:t>
+            </a:r>
+            <a:r>
+              <a:rPr lang="en-GB" sz="2400" dirty="0">
+                <a:latin typeface="Suisse Int'l" panose="020B0804000000000000" pitchFamily="34" charset="77"/>
+              </a:rPr>
+              <a:t>: no data about new user</a:t>
+            </a:r>
+          </a:p>
+          <a:p>
+            <a:pPr>
               <a:lnSpc>
                 <a:spcPct val="117000"/>
               </a:lnSpc>
-              <a:buFont typeface="+mj-lt"/>
-              <a:buAutoNum type="arabicParenR"/>
-            </a:pPr>
-            <a:r>
-              <a:rPr lang="en-GB" sz="2000" dirty="0">
-                <a:latin typeface="Suisse Int'l" panose="020B0804000000000000" pitchFamily="34" charset="77"/>
-              </a:rPr>
-              <a:t>Different user’s needs</a:t>
-            </a:r>
-          </a:p>
-          <a:p>
-            <a:pPr marL="914400" lvl="1" indent="-457200">
+            </a:pPr>
+            <a:r>
+              <a:rPr lang="en-GB" sz="2400" b="1" dirty="0">
+                <a:latin typeface="Suisse Int'l Semi Bold" panose="020B0804000000000000" pitchFamily="34" charset="77"/>
+              </a:rPr>
+              <a:t>Data sparsity problem</a:t>
+            </a:r>
+            <a:r>
+              <a:rPr lang="en-GB" sz="2400" dirty="0">
+                <a:latin typeface="Suisse Int'l" panose="020B0804000000000000" pitchFamily="34" charset="77"/>
+              </a:rPr>
+              <a:t>: a lot of data in aggregate, but very few data points for each individual user</a:t>
+            </a:r>
+          </a:p>
+          <a:p>
+            <a:pPr>
               <a:lnSpc>
                 <a:spcPct val="117000"/>
               </a:lnSpc>
-              <a:buFont typeface="+mj-lt"/>
-              <a:buAutoNum type="arabicParenR"/>
-            </a:pPr>
-            <a:r>
-              <a:rPr lang="en-GB" sz="2000" dirty="0">
-                <a:latin typeface="Suisse Int'l" panose="020B0804000000000000" pitchFamily="34" charset="77"/>
-              </a:rPr>
-              <a:t>Various user tasks</a:t>
-            </a:r>
-          </a:p>
-          <a:p>
-            <a:pPr marL="914400" lvl="1" indent="-457200">
-              <a:lnSpc>
-                <a:spcPct val="117000"/>
-              </a:lnSpc>
-              <a:buFont typeface="+mj-lt"/>
-              <a:buAutoNum type="arabicParenR"/>
-            </a:pPr>
-            <a:r>
-              <a:rPr lang="en-GB" sz="2000" dirty="0">
-                <a:latin typeface="Suisse Int'l" panose="020B0804000000000000" pitchFamily="34" charset="77"/>
-              </a:rPr>
-              <a:t>Joint task completion</a:t>
-            </a:r>
-          </a:p>
-          <a:p>
-            <a:pPr marL="914400" lvl="1" indent="-457200">
-              <a:lnSpc>
-                <a:spcPct val="117000"/>
-              </a:lnSpc>
-              <a:buFont typeface="+mj-lt"/>
-              <a:buAutoNum type="arabicParenR"/>
-            </a:pPr>
-            <a:r>
-              <a:rPr lang="en-GB" sz="2000" dirty="0">
-                <a:latin typeface="Suisse Int'l" panose="020B0804000000000000" pitchFamily="34" charset="77"/>
-              </a:rPr>
-              <a:t>Interactions with agents</a:t>
-            </a:r>
-          </a:p>
-          <a:p>
-            <a:pPr marL="914400" lvl="1" indent="-457200">
-              <a:lnSpc>
-                <a:spcPct val="117000"/>
-              </a:lnSpc>
-              <a:buFont typeface="+mj-lt"/>
-              <a:buAutoNum type="arabicParenR"/>
-            </a:pPr>
-            <a:r>
-              <a:rPr lang="en-GB" sz="2000" dirty="0">
-                <a:latin typeface="Suisse Int'l" panose="020B0804000000000000" pitchFamily="34" charset="77"/>
-              </a:rPr>
-              <a:t>Changing environment</a:t>
-            </a:r>
-          </a:p>
-          <a:p>
-            <a:pPr>
-              <a:lnSpc>
-                <a:spcPct val="117000"/>
-              </a:lnSpc>
-            </a:pPr>
-            <a:endParaRPr lang="en-GB" sz="2000" dirty="0">
-              <a:latin typeface="Suisse Int'l" panose="020B0804000000000000" pitchFamily="34" charset="77"/>
-            </a:endParaRPr>
+            </a:pPr>
+            <a:r>
+              <a:rPr lang="en-GB" sz="2400" dirty="0">
+                <a:latin typeface="Suisse Int'l" panose="020B0804000000000000" pitchFamily="34" charset="77"/>
+              </a:rPr>
+              <a:t>Promising hybrid AI approach: graph-learning recommender systems (GLRS) (Zhang et al., 2023) </a:t>
+            </a:r>
           </a:p>
         </p:txBody>
       </p:sp>
     </p:spTree>
     <p:extLst>
       <p:ext uri="{BB962C8B-B14F-4D97-AF65-F5344CB8AC3E}">
-        <p14:creationId xmlns:p14="http://schemas.microsoft.com/office/powerpoint/2010/main" val="3639702267"/>
+        <p14:creationId xmlns:p14="http://schemas.microsoft.com/office/powerpoint/2010/main" val="1106523288"/>
       </p:ext>
     </p:extLst>
   </p:cSld>

</xml_diff>